<commit_message>
favorites functionality + fixs
</commit_message>
<xml_diff>
--- a/docs/Презентация.pptx
+++ b/docs/Презентация.pptx
@@ -5,17 +5,19 @@
     <p:sldMasterId id="2147483738" r:id="rId1"/>
   </p:sldMasterIdLst>
   <p:notesMasterIdLst>
-    <p:notesMasterId r:id="rId7"/>
+    <p:notesMasterId r:id="rId9"/>
   </p:notesMasterIdLst>
   <p:handoutMasterIdLst>
-    <p:handoutMasterId r:id="rId8"/>
+    <p:handoutMasterId r:id="rId10"/>
   </p:handoutMasterIdLst>
   <p:sldIdLst>
     <p:sldId id="256" r:id="rId2"/>
     <p:sldId id="257" r:id="rId3"/>
-    <p:sldId id="259" r:id="rId4"/>
+    <p:sldId id="298" r:id="rId4"/>
     <p:sldId id="268" r:id="rId5"/>
     <p:sldId id="279" r:id="rId6"/>
+    <p:sldId id="280" r:id="rId7"/>
+    <p:sldId id="297" r:id="rId8"/>
   </p:sldIdLst>
   <p:sldSz cx="12192000" cy="6858000"/>
   <p:notesSz cx="6858000" cy="9144000"/>
@@ -227,7 +229,7 @@
           <a:p>
             <a:fld id="{7B839E6E-96FD-4730-94D2-AC1E10822BA2}" type="datetimeFigureOut">
               <a:rPr lang="ru-RU" smtClean="0"/>
-              <a:t>21.05.2024</a:t>
+              <a:t>01.06.2024</a:t>
             </a:fld>
             <a:endParaRPr lang="ru-RU"/>
           </a:p>
@@ -405,7 +407,7 @@
           <a:p>
             <a:fld id="{E40DA373-84D8-4F0B-A0E3-D64DE9FB8BBE}" type="datetimeFigureOut">
               <a:rPr lang="ru-RU" smtClean="0"/>
-              <a:t>21.05.2024</a:t>
+              <a:t>01.06.2024</a:t>
             </a:fld>
             <a:endParaRPr lang="ru-RU"/>
           </a:p>
@@ -673,6 +675,931 @@
 </p:notesMaster>
 </file>
 
+<file path=ppt/notesSlides/notesSlide1.xml><?xml version="1.0" encoding="utf-8"?>
+<p:notes xmlns:a="http://schemas.openxmlformats.org/drawingml/2006/main" xmlns:r="http://schemas.openxmlformats.org/officeDocument/2006/relationships" xmlns:p="http://schemas.openxmlformats.org/presentationml/2006/main">
+  <p:cSld>
+    <p:spTree>
+      <p:nvGrpSpPr>
+        <p:cNvPr id="1" name=""/>
+        <p:cNvGrpSpPr/>
+        <p:nvPr/>
+      </p:nvGrpSpPr>
+      <p:grpSpPr>
+        <a:xfrm>
+          <a:off x="0" y="0"/>
+          <a:ext cx="0" cy="0"/>
+          <a:chOff x="0" y="0"/>
+          <a:chExt cx="0" cy="0"/>
+        </a:xfrm>
+      </p:grpSpPr>
+      <p:sp>
+        <p:nvSpPr>
+          <p:cNvPr id="2" name="Образ слайда 1"/>
+          <p:cNvSpPr>
+            <a:spLocks noGrp="1" noRot="1" noChangeAspect="1"/>
+          </p:cNvSpPr>
+          <p:nvPr>
+            <p:ph type="sldImg"/>
+          </p:nvPr>
+        </p:nvSpPr>
+        <p:spPr/>
+      </p:sp>
+      <p:sp>
+        <p:nvSpPr>
+          <p:cNvPr id="3" name="Заметки 2"/>
+          <p:cNvSpPr>
+            <a:spLocks noGrp="1"/>
+          </p:cNvSpPr>
+          <p:nvPr>
+            <p:ph type="body" idx="1"/>
+          </p:nvPr>
+        </p:nvSpPr>
+        <p:spPr/>
+        <p:txBody>
+          <a:bodyPr/>
+          <a:lstStyle/>
+          <a:p>
+            <a:pPr marL="0" marR="0" lvl="0" indent="0" algn="l" defTabSz="914400" rtl="0" eaLnBrk="1" fontAlgn="auto" latinLnBrk="0" hangingPunct="1">
+              <a:lnSpc>
+                <a:spcPct val="100000"/>
+              </a:lnSpc>
+              <a:spcBef>
+                <a:spcPts val="0"/>
+              </a:spcBef>
+              <a:spcAft>
+                <a:spcPts val="0"/>
+              </a:spcAft>
+              <a:buClrTx/>
+              <a:buSzTx/>
+              <a:buFontTx/>
+              <a:buNone/>
+              <a:tabLst/>
+              <a:defRPr/>
+            </a:pPr>
+            <a:r>
+              <a:rPr lang="ru-RU" sz="1200" kern="1200" dirty="0">
+                <a:solidFill>
+                  <a:schemeClr val="tx1"/>
+                </a:solidFill>
+                <a:effectLst/>
+                <a:latin typeface="+mn-lt"/>
+                <a:ea typeface="+mn-ea"/>
+                <a:cs typeface="+mn-cs"/>
+              </a:rPr>
+              <a:t>Здравствуйте, уважаемая комиссия! Тема моего дипломного проекта «Интернет-магазин «Сладости»»</a:t>
+            </a:r>
+            <a:endParaRPr lang="ru-RU" dirty="0"/>
+          </a:p>
+        </p:txBody>
+      </p:sp>
+      <p:sp>
+        <p:nvSpPr>
+          <p:cNvPr id="4" name="Нижний колонтитул 3"/>
+          <p:cNvSpPr>
+            <a:spLocks noGrp="1"/>
+          </p:cNvSpPr>
+          <p:nvPr>
+            <p:ph type="ftr" sz="quarter" idx="4"/>
+          </p:nvPr>
+        </p:nvSpPr>
+        <p:spPr/>
+        <p:txBody>
+          <a:bodyPr/>
+          <a:lstStyle/>
+          <a:p>
+            <a:endParaRPr lang="ru-RU"/>
+          </a:p>
+        </p:txBody>
+      </p:sp>
+      <p:sp>
+        <p:nvSpPr>
+          <p:cNvPr id="5" name="Номер слайда 4"/>
+          <p:cNvSpPr>
+            <a:spLocks noGrp="1"/>
+          </p:cNvSpPr>
+          <p:nvPr>
+            <p:ph type="sldNum" sz="quarter" idx="5"/>
+          </p:nvPr>
+        </p:nvSpPr>
+        <p:spPr/>
+        <p:txBody>
+          <a:bodyPr/>
+          <a:lstStyle/>
+          <a:p>
+            <a:fld id="{D0E2570F-E218-488D-818A-B51840EA09A2}" type="slidenum">
+              <a:rPr lang="ru-RU" smtClean="0"/>
+              <a:t>1</a:t>
+            </a:fld>
+            <a:endParaRPr lang="ru-RU"/>
+          </a:p>
+        </p:txBody>
+      </p:sp>
+    </p:spTree>
+    <p:extLst>
+      <p:ext uri="{BB962C8B-B14F-4D97-AF65-F5344CB8AC3E}">
+        <p14:creationId xmlns:p14="http://schemas.microsoft.com/office/powerpoint/2010/main" val="2706518159"/>
+      </p:ext>
+    </p:extLst>
+  </p:cSld>
+  <p:clrMapOvr>
+    <a:masterClrMapping/>
+  </p:clrMapOvr>
+</p:notes>
+</file>
+
+<file path=ppt/notesSlides/notesSlide2.xml><?xml version="1.0" encoding="utf-8"?>
+<p:notes xmlns:a="http://schemas.openxmlformats.org/drawingml/2006/main" xmlns:r="http://schemas.openxmlformats.org/officeDocument/2006/relationships" xmlns:p="http://schemas.openxmlformats.org/presentationml/2006/main">
+  <p:cSld>
+    <p:spTree>
+      <p:nvGrpSpPr>
+        <p:cNvPr id="1" name=""/>
+        <p:cNvGrpSpPr/>
+        <p:nvPr/>
+      </p:nvGrpSpPr>
+      <p:grpSpPr>
+        <a:xfrm>
+          <a:off x="0" y="0"/>
+          <a:ext cx="0" cy="0"/>
+          <a:chOff x="0" y="0"/>
+          <a:chExt cx="0" cy="0"/>
+        </a:xfrm>
+      </p:grpSpPr>
+      <p:sp>
+        <p:nvSpPr>
+          <p:cNvPr id="2" name="Образ слайда 1"/>
+          <p:cNvSpPr>
+            <a:spLocks noGrp="1" noRot="1" noChangeAspect="1"/>
+          </p:cNvSpPr>
+          <p:nvPr>
+            <p:ph type="sldImg"/>
+          </p:nvPr>
+        </p:nvSpPr>
+        <p:spPr/>
+      </p:sp>
+      <p:sp>
+        <p:nvSpPr>
+          <p:cNvPr id="3" name="Заметки 2"/>
+          <p:cNvSpPr>
+            <a:spLocks noGrp="1"/>
+          </p:cNvSpPr>
+          <p:nvPr>
+            <p:ph type="body" idx="1"/>
+          </p:nvPr>
+        </p:nvSpPr>
+        <p:spPr/>
+        <p:txBody>
+          <a:bodyPr/>
+          <a:lstStyle/>
+          <a:p>
+            <a:r>
+              <a:rPr lang="ru-RU" sz="1200" kern="1200" dirty="0">
+                <a:solidFill>
+                  <a:schemeClr val="tx1"/>
+                </a:solidFill>
+                <a:effectLst/>
+                <a:latin typeface="+mn-lt"/>
+                <a:ea typeface="+mn-ea"/>
+                <a:cs typeface="+mn-cs"/>
+              </a:rPr>
+              <a:t>Целью дипломного проектирования является</a:t>
+            </a:r>
+            <a:r>
+              <a:rPr lang="en-US" sz="1200" kern="1200" dirty="0">
+                <a:solidFill>
+                  <a:schemeClr val="tx1"/>
+                </a:solidFill>
+                <a:effectLst/>
+                <a:latin typeface="+mn-lt"/>
+                <a:ea typeface="+mn-ea"/>
+                <a:cs typeface="+mn-cs"/>
+              </a:rPr>
+              <a:t> </a:t>
+            </a:r>
+            <a:r>
+              <a:rPr lang="ru-RU" sz="1200" kern="1200" dirty="0">
+                <a:solidFill>
+                  <a:schemeClr val="tx1"/>
+                </a:solidFill>
+                <a:effectLst/>
+                <a:latin typeface="+mn-lt"/>
+                <a:ea typeface="+mn-ea"/>
+                <a:cs typeface="+mn-cs"/>
+              </a:rPr>
+              <a:t>разработка </a:t>
+            </a:r>
+            <a:r>
+              <a:rPr lang="ru-RU" sz="1200" dirty="0">
+                <a:latin typeface="+mj-lt"/>
+              </a:rPr>
+              <a:t>интернет–магазина «Сладости»</a:t>
+            </a:r>
+            <a:endParaRPr lang="ru-RU" sz="1200" kern="1200" dirty="0">
+              <a:solidFill>
+                <a:schemeClr val="tx1"/>
+              </a:solidFill>
+              <a:effectLst/>
+              <a:latin typeface="+mn-lt"/>
+              <a:ea typeface="+mn-ea"/>
+              <a:cs typeface="+mn-cs"/>
+            </a:endParaRPr>
+          </a:p>
+          <a:p>
+            <a:endParaRPr lang="ru-RU" sz="1200" kern="1200" dirty="0">
+              <a:solidFill>
+                <a:schemeClr val="tx1"/>
+              </a:solidFill>
+              <a:effectLst/>
+              <a:latin typeface="+mn-lt"/>
+              <a:ea typeface="+mn-ea"/>
+              <a:cs typeface="+mn-cs"/>
+            </a:endParaRPr>
+          </a:p>
+          <a:p>
+            <a:r>
+              <a:rPr lang="ru-RU" sz="1200" b="0" kern="1200" dirty="0">
+                <a:solidFill>
+                  <a:schemeClr val="tx1"/>
+                </a:solidFill>
+                <a:effectLst/>
+                <a:latin typeface="+mn-lt"/>
+                <a:ea typeface="+mn-ea"/>
+                <a:cs typeface="+mn-cs"/>
+              </a:rPr>
+              <a:t>Задачи </a:t>
+            </a:r>
+            <a:r>
+              <a:rPr lang="ru-RU" sz="1200" b="0" dirty="0">
+                <a:solidFill>
+                  <a:schemeClr val="accent1"/>
+                </a:solidFill>
+                <a:latin typeface="Arial" panose="020B0604020202020204" pitchFamily="34" charset="0"/>
+                <a:cs typeface="Arial" panose="020B0604020202020204" pitchFamily="34" charset="0"/>
+              </a:rPr>
+              <a:t>дипломного проектирования </a:t>
+            </a:r>
+            <a:r>
+              <a:rPr lang="ru-RU" sz="1200" b="0" kern="1200" dirty="0">
+                <a:solidFill>
+                  <a:schemeClr val="tx1"/>
+                </a:solidFill>
+                <a:effectLst/>
+                <a:latin typeface="+mn-lt"/>
+                <a:ea typeface="+mn-ea"/>
+                <a:cs typeface="+mn-cs"/>
+              </a:rPr>
+              <a:t>представлены </a:t>
+            </a:r>
+            <a:r>
+              <a:rPr lang="ru-RU" sz="1200" kern="1200" dirty="0">
+                <a:solidFill>
+                  <a:schemeClr val="tx1"/>
+                </a:solidFill>
+                <a:effectLst/>
+                <a:latin typeface="+mn-lt"/>
+                <a:ea typeface="+mn-ea"/>
+                <a:cs typeface="+mn-cs"/>
+              </a:rPr>
+              <a:t>на слайде</a:t>
+            </a:r>
+          </a:p>
+        </p:txBody>
+      </p:sp>
+      <p:sp>
+        <p:nvSpPr>
+          <p:cNvPr id="4" name="Нижний колонтитул 3"/>
+          <p:cNvSpPr>
+            <a:spLocks noGrp="1"/>
+          </p:cNvSpPr>
+          <p:nvPr>
+            <p:ph type="ftr" sz="quarter" idx="4"/>
+          </p:nvPr>
+        </p:nvSpPr>
+        <p:spPr/>
+        <p:txBody>
+          <a:bodyPr/>
+          <a:lstStyle/>
+          <a:p>
+            <a:endParaRPr lang="ru-RU"/>
+          </a:p>
+        </p:txBody>
+      </p:sp>
+      <p:sp>
+        <p:nvSpPr>
+          <p:cNvPr id="5" name="Номер слайда 4"/>
+          <p:cNvSpPr>
+            <a:spLocks noGrp="1"/>
+          </p:cNvSpPr>
+          <p:nvPr>
+            <p:ph type="sldNum" sz="quarter" idx="5"/>
+          </p:nvPr>
+        </p:nvSpPr>
+        <p:spPr/>
+        <p:txBody>
+          <a:bodyPr/>
+          <a:lstStyle/>
+          <a:p>
+            <a:fld id="{D0E2570F-E218-488D-818A-B51840EA09A2}" type="slidenum">
+              <a:rPr lang="ru-RU" smtClean="0"/>
+              <a:t>2</a:t>
+            </a:fld>
+            <a:endParaRPr lang="ru-RU"/>
+          </a:p>
+        </p:txBody>
+      </p:sp>
+    </p:spTree>
+    <p:extLst>
+      <p:ext uri="{BB962C8B-B14F-4D97-AF65-F5344CB8AC3E}">
+        <p14:creationId xmlns:p14="http://schemas.microsoft.com/office/powerpoint/2010/main" val="2445518158"/>
+      </p:ext>
+    </p:extLst>
+  </p:cSld>
+  <p:clrMapOvr>
+    <a:masterClrMapping/>
+  </p:clrMapOvr>
+</p:notes>
+</file>
+
+<file path=ppt/notesSlides/notesSlide3.xml><?xml version="1.0" encoding="utf-8"?>
+<p:notes xmlns:a="http://schemas.openxmlformats.org/drawingml/2006/main" xmlns:r="http://schemas.openxmlformats.org/officeDocument/2006/relationships" xmlns:p="http://schemas.openxmlformats.org/presentationml/2006/main">
+  <p:cSld>
+    <p:spTree>
+      <p:nvGrpSpPr>
+        <p:cNvPr id="1" name=""/>
+        <p:cNvGrpSpPr/>
+        <p:nvPr/>
+      </p:nvGrpSpPr>
+      <p:grpSpPr>
+        <a:xfrm>
+          <a:off x="0" y="0"/>
+          <a:ext cx="0" cy="0"/>
+          <a:chOff x="0" y="0"/>
+          <a:chExt cx="0" cy="0"/>
+        </a:xfrm>
+      </p:grpSpPr>
+      <p:sp>
+        <p:nvSpPr>
+          <p:cNvPr id="2" name="Образ слайда 1"/>
+          <p:cNvSpPr>
+            <a:spLocks noGrp="1" noRot="1" noChangeAspect="1"/>
+          </p:cNvSpPr>
+          <p:nvPr>
+            <p:ph type="sldImg"/>
+          </p:nvPr>
+        </p:nvSpPr>
+        <p:spPr/>
+      </p:sp>
+      <p:sp>
+        <p:nvSpPr>
+          <p:cNvPr id="3" name="Заметки 2"/>
+          <p:cNvSpPr>
+            <a:spLocks noGrp="1"/>
+          </p:cNvSpPr>
+          <p:nvPr>
+            <p:ph type="body" idx="1"/>
+          </p:nvPr>
+        </p:nvSpPr>
+        <p:spPr/>
+        <p:txBody>
+          <a:bodyPr/>
+          <a:lstStyle/>
+          <a:p>
+            <a:endParaRPr lang="ru-RU" dirty="0"/>
+          </a:p>
+        </p:txBody>
+      </p:sp>
+      <p:sp>
+        <p:nvSpPr>
+          <p:cNvPr id="4" name="Нижний колонтитул 3"/>
+          <p:cNvSpPr>
+            <a:spLocks noGrp="1"/>
+          </p:cNvSpPr>
+          <p:nvPr>
+            <p:ph type="ftr" sz="quarter" idx="4"/>
+          </p:nvPr>
+        </p:nvSpPr>
+        <p:spPr/>
+        <p:txBody>
+          <a:bodyPr/>
+          <a:lstStyle/>
+          <a:p>
+            <a:endParaRPr lang="ru-RU"/>
+          </a:p>
+        </p:txBody>
+      </p:sp>
+      <p:sp>
+        <p:nvSpPr>
+          <p:cNvPr id="5" name="Номер слайда 4"/>
+          <p:cNvSpPr>
+            <a:spLocks noGrp="1"/>
+          </p:cNvSpPr>
+          <p:nvPr>
+            <p:ph type="sldNum" sz="quarter" idx="5"/>
+          </p:nvPr>
+        </p:nvSpPr>
+        <p:spPr/>
+        <p:txBody>
+          <a:bodyPr/>
+          <a:lstStyle/>
+          <a:p>
+            <a:fld id="{D0E2570F-E218-488D-818A-B51840EA09A2}" type="slidenum">
+              <a:rPr lang="ru-RU" smtClean="0"/>
+              <a:t>3</a:t>
+            </a:fld>
+            <a:endParaRPr lang="ru-RU"/>
+          </a:p>
+        </p:txBody>
+      </p:sp>
+    </p:spTree>
+    <p:extLst>
+      <p:ext uri="{BB962C8B-B14F-4D97-AF65-F5344CB8AC3E}">
+        <p14:creationId xmlns:p14="http://schemas.microsoft.com/office/powerpoint/2010/main" val="1125653877"/>
+      </p:ext>
+    </p:extLst>
+  </p:cSld>
+  <p:clrMapOvr>
+    <a:masterClrMapping/>
+  </p:clrMapOvr>
+</p:notes>
+</file>
+
+<file path=ppt/notesSlides/notesSlide4.xml><?xml version="1.0" encoding="utf-8"?>
+<p:notes xmlns:a="http://schemas.openxmlformats.org/drawingml/2006/main" xmlns:r="http://schemas.openxmlformats.org/officeDocument/2006/relationships" xmlns:p="http://schemas.openxmlformats.org/presentationml/2006/main">
+  <p:cSld>
+    <p:spTree>
+      <p:nvGrpSpPr>
+        <p:cNvPr id="1" name=""/>
+        <p:cNvGrpSpPr/>
+        <p:nvPr/>
+      </p:nvGrpSpPr>
+      <p:grpSpPr>
+        <a:xfrm>
+          <a:off x="0" y="0"/>
+          <a:ext cx="0" cy="0"/>
+          <a:chOff x="0" y="0"/>
+          <a:chExt cx="0" cy="0"/>
+        </a:xfrm>
+      </p:grpSpPr>
+      <p:sp>
+        <p:nvSpPr>
+          <p:cNvPr id="2" name="Образ слайда 1"/>
+          <p:cNvSpPr>
+            <a:spLocks noGrp="1" noRot="1" noChangeAspect="1"/>
+          </p:cNvSpPr>
+          <p:nvPr>
+            <p:ph type="sldImg"/>
+          </p:nvPr>
+        </p:nvSpPr>
+        <p:spPr/>
+      </p:sp>
+      <p:sp>
+        <p:nvSpPr>
+          <p:cNvPr id="3" name="Заметки 2"/>
+          <p:cNvSpPr>
+            <a:spLocks noGrp="1"/>
+          </p:cNvSpPr>
+          <p:nvPr>
+            <p:ph type="body" idx="1"/>
+          </p:nvPr>
+        </p:nvSpPr>
+        <p:spPr/>
+        <p:txBody>
+          <a:bodyPr/>
+          <a:lstStyle/>
+          <a:p>
+            <a:pPr marL="0" marR="0" lvl="0" indent="0" algn="l" defTabSz="914400" rtl="0" eaLnBrk="1" fontAlgn="auto" latinLnBrk="0" hangingPunct="1">
+              <a:lnSpc>
+                <a:spcPct val="100000"/>
+              </a:lnSpc>
+              <a:spcBef>
+                <a:spcPts val="0"/>
+              </a:spcBef>
+              <a:spcAft>
+                <a:spcPts val="0"/>
+              </a:spcAft>
+              <a:buClrTx/>
+              <a:buSzTx/>
+              <a:buFontTx/>
+              <a:buNone/>
+              <a:tabLst/>
+              <a:defRPr/>
+            </a:pPr>
+            <a:r>
+              <a:rPr lang="ru-RU" sz="1200" kern="1200" dirty="0">
+                <a:solidFill>
+                  <a:schemeClr val="tx1"/>
+                </a:solidFill>
+                <a:effectLst/>
+                <a:latin typeface="+mn-lt"/>
+                <a:ea typeface="+mn-ea"/>
+                <a:cs typeface="+mn-cs"/>
+              </a:rPr>
+              <a:t>На этапе проектирования базы данных, была построена ER-модель базы данных интернет-магазина, которая содержит 5 таблиц</a:t>
+            </a:r>
+            <a:endParaRPr lang="ru-RU" dirty="0"/>
+          </a:p>
+        </p:txBody>
+      </p:sp>
+      <p:sp>
+        <p:nvSpPr>
+          <p:cNvPr id="4" name="Нижний колонтитул 3"/>
+          <p:cNvSpPr>
+            <a:spLocks noGrp="1"/>
+          </p:cNvSpPr>
+          <p:nvPr>
+            <p:ph type="ftr" sz="quarter" idx="4"/>
+          </p:nvPr>
+        </p:nvSpPr>
+        <p:spPr/>
+        <p:txBody>
+          <a:bodyPr/>
+          <a:lstStyle/>
+          <a:p>
+            <a:endParaRPr lang="ru-RU"/>
+          </a:p>
+        </p:txBody>
+      </p:sp>
+      <p:sp>
+        <p:nvSpPr>
+          <p:cNvPr id="5" name="Номер слайда 4"/>
+          <p:cNvSpPr>
+            <a:spLocks noGrp="1"/>
+          </p:cNvSpPr>
+          <p:nvPr>
+            <p:ph type="sldNum" sz="quarter" idx="5"/>
+          </p:nvPr>
+        </p:nvSpPr>
+        <p:spPr/>
+        <p:txBody>
+          <a:bodyPr/>
+          <a:lstStyle/>
+          <a:p>
+            <a:fld id="{D0E2570F-E218-488D-818A-B51840EA09A2}" type="slidenum">
+              <a:rPr lang="ru-RU" smtClean="0"/>
+              <a:t>4</a:t>
+            </a:fld>
+            <a:endParaRPr lang="ru-RU"/>
+          </a:p>
+        </p:txBody>
+      </p:sp>
+    </p:spTree>
+    <p:extLst>
+      <p:ext uri="{BB962C8B-B14F-4D97-AF65-F5344CB8AC3E}">
+        <p14:creationId xmlns:p14="http://schemas.microsoft.com/office/powerpoint/2010/main" val="3487744847"/>
+      </p:ext>
+    </p:extLst>
+  </p:cSld>
+  <p:clrMapOvr>
+    <a:masterClrMapping/>
+  </p:clrMapOvr>
+</p:notes>
+</file>
+
+<file path=ppt/notesSlides/notesSlide5.xml><?xml version="1.0" encoding="utf-8"?>
+<p:notes xmlns:a="http://schemas.openxmlformats.org/drawingml/2006/main" xmlns:r="http://schemas.openxmlformats.org/officeDocument/2006/relationships" xmlns:p="http://schemas.openxmlformats.org/presentationml/2006/main">
+  <p:cSld>
+    <p:spTree>
+      <p:nvGrpSpPr>
+        <p:cNvPr id="1" name=""/>
+        <p:cNvGrpSpPr/>
+        <p:nvPr/>
+      </p:nvGrpSpPr>
+      <p:grpSpPr>
+        <a:xfrm>
+          <a:off x="0" y="0"/>
+          <a:ext cx="0" cy="0"/>
+          <a:chOff x="0" y="0"/>
+          <a:chExt cx="0" cy="0"/>
+        </a:xfrm>
+      </p:grpSpPr>
+      <p:sp>
+        <p:nvSpPr>
+          <p:cNvPr id="2" name="Образ слайда 1"/>
+          <p:cNvSpPr>
+            <a:spLocks noGrp="1" noRot="1" noChangeAspect="1"/>
+          </p:cNvSpPr>
+          <p:nvPr>
+            <p:ph type="sldImg"/>
+          </p:nvPr>
+        </p:nvSpPr>
+        <p:spPr/>
+      </p:sp>
+      <p:sp>
+        <p:nvSpPr>
+          <p:cNvPr id="3" name="Заметки 2"/>
+          <p:cNvSpPr>
+            <a:spLocks noGrp="1"/>
+          </p:cNvSpPr>
+          <p:nvPr>
+            <p:ph type="body" idx="1"/>
+          </p:nvPr>
+        </p:nvSpPr>
+        <p:spPr/>
+        <p:txBody>
+          <a:bodyPr/>
+          <a:lstStyle/>
+          <a:p>
+            <a:pPr marL="0" marR="0" lvl="0" indent="0" algn="l" defTabSz="914400" rtl="0" eaLnBrk="1" fontAlgn="auto" latinLnBrk="0" hangingPunct="1">
+              <a:lnSpc>
+                <a:spcPct val="100000"/>
+              </a:lnSpc>
+              <a:spcBef>
+                <a:spcPts val="0"/>
+              </a:spcBef>
+              <a:spcAft>
+                <a:spcPts val="0"/>
+              </a:spcAft>
+              <a:buClrTx/>
+              <a:buSzTx/>
+              <a:buFontTx/>
+              <a:buNone/>
+              <a:tabLst/>
+              <a:defRPr/>
+            </a:pPr>
+            <a:r>
+              <a:rPr lang="ru-RU" dirty="0"/>
+              <a:t>В процессе проектирования построена схема навигации, которая представлена на слайде.</a:t>
+            </a:r>
+          </a:p>
+          <a:p>
+            <a:endParaRPr lang="ru-RU" dirty="0"/>
+          </a:p>
+        </p:txBody>
+      </p:sp>
+      <p:sp>
+        <p:nvSpPr>
+          <p:cNvPr id="4" name="Нижний колонтитул 3"/>
+          <p:cNvSpPr>
+            <a:spLocks noGrp="1"/>
+          </p:cNvSpPr>
+          <p:nvPr>
+            <p:ph type="ftr" sz="quarter" idx="4"/>
+          </p:nvPr>
+        </p:nvSpPr>
+        <p:spPr/>
+        <p:txBody>
+          <a:bodyPr/>
+          <a:lstStyle/>
+          <a:p>
+            <a:endParaRPr lang="ru-RU"/>
+          </a:p>
+        </p:txBody>
+      </p:sp>
+      <p:sp>
+        <p:nvSpPr>
+          <p:cNvPr id="5" name="Номер слайда 4"/>
+          <p:cNvSpPr>
+            <a:spLocks noGrp="1"/>
+          </p:cNvSpPr>
+          <p:nvPr>
+            <p:ph type="sldNum" sz="quarter" idx="5"/>
+          </p:nvPr>
+        </p:nvSpPr>
+        <p:spPr/>
+        <p:txBody>
+          <a:bodyPr/>
+          <a:lstStyle/>
+          <a:p>
+            <a:fld id="{D0E2570F-E218-488D-818A-B51840EA09A2}" type="slidenum">
+              <a:rPr lang="ru-RU" smtClean="0"/>
+              <a:t>5</a:t>
+            </a:fld>
+            <a:endParaRPr lang="ru-RU"/>
+          </a:p>
+        </p:txBody>
+      </p:sp>
+    </p:spTree>
+    <p:extLst>
+      <p:ext uri="{BB962C8B-B14F-4D97-AF65-F5344CB8AC3E}">
+        <p14:creationId xmlns:p14="http://schemas.microsoft.com/office/powerpoint/2010/main" val="2357234251"/>
+      </p:ext>
+    </p:extLst>
+  </p:cSld>
+  <p:clrMapOvr>
+    <a:masterClrMapping/>
+  </p:clrMapOvr>
+</p:notes>
+</file>
+
+<file path=ppt/notesSlides/notesSlide6.xml><?xml version="1.0" encoding="utf-8"?>
+<p:notes xmlns:a="http://schemas.openxmlformats.org/drawingml/2006/main" xmlns:r="http://schemas.openxmlformats.org/officeDocument/2006/relationships" xmlns:p="http://schemas.openxmlformats.org/presentationml/2006/main">
+  <p:cSld>
+    <p:spTree>
+      <p:nvGrpSpPr>
+        <p:cNvPr id="1" name=""/>
+        <p:cNvGrpSpPr/>
+        <p:nvPr/>
+      </p:nvGrpSpPr>
+      <p:grpSpPr>
+        <a:xfrm>
+          <a:off x="0" y="0"/>
+          <a:ext cx="0" cy="0"/>
+          <a:chOff x="0" y="0"/>
+          <a:chExt cx="0" cy="0"/>
+        </a:xfrm>
+      </p:grpSpPr>
+      <p:sp>
+        <p:nvSpPr>
+          <p:cNvPr id="2" name="Образ слайда 1"/>
+          <p:cNvSpPr>
+            <a:spLocks noGrp="1" noRot="1" noChangeAspect="1"/>
+          </p:cNvSpPr>
+          <p:nvPr>
+            <p:ph type="sldImg"/>
+          </p:nvPr>
+        </p:nvSpPr>
+        <p:spPr/>
+      </p:sp>
+      <p:sp>
+        <p:nvSpPr>
+          <p:cNvPr id="3" name="Заметки 2"/>
+          <p:cNvSpPr>
+            <a:spLocks noGrp="1"/>
+          </p:cNvSpPr>
+          <p:nvPr>
+            <p:ph type="body" idx="1"/>
+          </p:nvPr>
+        </p:nvSpPr>
+        <p:spPr/>
+        <p:txBody>
+          <a:bodyPr/>
+          <a:lstStyle/>
+          <a:p>
+            <a:r>
+              <a:rPr lang="ru-RU" dirty="0"/>
+              <a:t>Демонстрация программного продукта</a:t>
+            </a:r>
+          </a:p>
+          <a:p>
+            <a:endParaRPr lang="ru-RU" dirty="0"/>
+          </a:p>
+          <a:p>
+            <a:endParaRPr lang="ru-RU" dirty="0"/>
+          </a:p>
+          <a:p>
+            <a:r>
+              <a:rPr lang="ru-RU" dirty="0"/>
+              <a:t>При работе выделены 4 ролей…перечислить</a:t>
+            </a:r>
+          </a:p>
+        </p:txBody>
+      </p:sp>
+      <p:sp>
+        <p:nvSpPr>
+          <p:cNvPr id="4" name="Нижний колонтитул 3"/>
+          <p:cNvSpPr>
+            <a:spLocks noGrp="1"/>
+          </p:cNvSpPr>
+          <p:nvPr>
+            <p:ph type="ftr" sz="quarter" idx="4"/>
+          </p:nvPr>
+        </p:nvSpPr>
+        <p:spPr/>
+        <p:txBody>
+          <a:bodyPr/>
+          <a:lstStyle/>
+          <a:p>
+            <a:endParaRPr lang="ru-RU"/>
+          </a:p>
+        </p:txBody>
+      </p:sp>
+      <p:sp>
+        <p:nvSpPr>
+          <p:cNvPr id="5" name="Номер слайда 4"/>
+          <p:cNvSpPr>
+            <a:spLocks noGrp="1"/>
+          </p:cNvSpPr>
+          <p:nvPr>
+            <p:ph type="sldNum" sz="quarter" idx="5"/>
+          </p:nvPr>
+        </p:nvSpPr>
+        <p:spPr/>
+        <p:txBody>
+          <a:bodyPr/>
+          <a:lstStyle/>
+          <a:p>
+            <a:fld id="{D0E2570F-E218-488D-818A-B51840EA09A2}" type="slidenum">
+              <a:rPr lang="ru-RU" smtClean="0"/>
+              <a:t>6</a:t>
+            </a:fld>
+            <a:endParaRPr lang="ru-RU"/>
+          </a:p>
+        </p:txBody>
+      </p:sp>
+    </p:spTree>
+    <p:extLst>
+      <p:ext uri="{BB962C8B-B14F-4D97-AF65-F5344CB8AC3E}">
+        <p14:creationId xmlns:p14="http://schemas.microsoft.com/office/powerpoint/2010/main" val="3991723243"/>
+      </p:ext>
+    </p:extLst>
+  </p:cSld>
+  <p:clrMapOvr>
+    <a:masterClrMapping/>
+  </p:clrMapOvr>
+</p:notes>
+</file>
+
+<file path=ppt/notesSlides/notesSlide7.xml><?xml version="1.0" encoding="utf-8"?>
+<p:notes xmlns:a="http://schemas.openxmlformats.org/drawingml/2006/main" xmlns:r="http://schemas.openxmlformats.org/officeDocument/2006/relationships" xmlns:p="http://schemas.openxmlformats.org/presentationml/2006/main">
+  <p:cSld>
+    <p:spTree>
+      <p:nvGrpSpPr>
+        <p:cNvPr id="1" name=""/>
+        <p:cNvGrpSpPr/>
+        <p:nvPr/>
+      </p:nvGrpSpPr>
+      <p:grpSpPr>
+        <a:xfrm>
+          <a:off x="0" y="0"/>
+          <a:ext cx="0" cy="0"/>
+          <a:chOff x="0" y="0"/>
+          <a:chExt cx="0" cy="0"/>
+        </a:xfrm>
+      </p:grpSpPr>
+      <p:sp>
+        <p:nvSpPr>
+          <p:cNvPr id="2" name="Образ слайда 1"/>
+          <p:cNvSpPr>
+            <a:spLocks noGrp="1" noRot="1" noChangeAspect="1"/>
+          </p:cNvSpPr>
+          <p:nvPr>
+            <p:ph type="sldImg"/>
+          </p:nvPr>
+        </p:nvSpPr>
+        <p:spPr/>
+      </p:sp>
+      <p:sp>
+        <p:nvSpPr>
+          <p:cNvPr id="3" name="Заметки 2"/>
+          <p:cNvSpPr>
+            <a:spLocks noGrp="1"/>
+          </p:cNvSpPr>
+          <p:nvPr>
+            <p:ph type="body" idx="1"/>
+          </p:nvPr>
+        </p:nvSpPr>
+        <p:spPr/>
+        <p:txBody>
+          <a:bodyPr/>
+          <a:lstStyle/>
+          <a:p>
+            <a:r>
+              <a:rPr lang="ru-RU" dirty="0"/>
+              <a:t>Таким образом в процессе дипломного проектирования продемонстрирован (вставить вид деятельности) в части реализации функционала (вставить) , </a:t>
+            </a:r>
+          </a:p>
+          <a:p>
+            <a:r>
+              <a:rPr lang="ru-RU" dirty="0"/>
+              <a:t>также было выполнено …… (вставить вид деятельности) через (…..вставить) , </a:t>
+            </a:r>
+          </a:p>
+          <a:p>
+            <a:endParaRPr lang="ru-RU" dirty="0"/>
+          </a:p>
+          <a:p>
+            <a:r>
+              <a:rPr lang="ru-RU" dirty="0"/>
+              <a:t>В результате все цели дипломного проекта были выполнены. Спасибо.</a:t>
+            </a:r>
+          </a:p>
+        </p:txBody>
+      </p:sp>
+      <p:sp>
+        <p:nvSpPr>
+          <p:cNvPr id="4" name="Номер слайда 3"/>
+          <p:cNvSpPr>
+            <a:spLocks noGrp="1"/>
+          </p:cNvSpPr>
+          <p:nvPr>
+            <p:ph type="sldNum" sz="quarter" idx="5"/>
+          </p:nvPr>
+        </p:nvSpPr>
+        <p:spPr/>
+        <p:txBody>
+          <a:bodyPr/>
+          <a:lstStyle/>
+          <a:p>
+            <a:fld id="{E0AF4460-6503-445B-8A56-0254AB65E7A1}" type="slidenum">
+              <a:rPr lang="en-US" smtClean="0"/>
+              <a:t>7</a:t>
+            </a:fld>
+            <a:endParaRPr lang="en-US"/>
+          </a:p>
+        </p:txBody>
+      </p:sp>
+    </p:spTree>
+    <p:extLst>
+      <p:ext uri="{BB962C8B-B14F-4D97-AF65-F5344CB8AC3E}">
+        <p14:creationId xmlns:p14="http://schemas.microsoft.com/office/powerpoint/2010/main" val="2727754247"/>
+      </p:ext>
+    </p:extLst>
+  </p:cSld>
+  <p:clrMapOvr>
+    <a:masterClrMapping/>
+  </p:clrMapOvr>
+</p:notes>
+</file>
+
 <file path=ppt/slideLayouts/slideLayout1.xml><?xml version="1.0" encoding="utf-8"?>
 <p:sldLayout xmlns:a="http://schemas.openxmlformats.org/drawingml/2006/main" xmlns:r="http://schemas.openxmlformats.org/officeDocument/2006/relationships" xmlns:p="http://schemas.openxmlformats.org/presentationml/2006/main" showMasterSp="0" type="title" preserve="1">
   <p:cSld name="Титульный слайд">
@@ -899,7 +1826,7 @@
           <a:p>
             <a:fld id="{BE70DB91-0AD3-4146-B259-4438824C95FB}" type="datetime1">
               <a:rPr lang="ru-RU" smtClean="0"/>
-              <a:t>21.05.2024</a:t>
+              <a:t>01.06.2024</a:t>
             </a:fld>
             <a:endParaRPr lang="ru-RU"/>
           </a:p>
@@ -1110,7 +2037,7 @@
           <a:p>
             <a:fld id="{41C13CC8-8D9C-448F-B257-C532B1DE217B}" type="datetime1">
               <a:rPr lang="ru-RU" smtClean="0"/>
-              <a:t>21.05.2024</a:t>
+              <a:t>01.06.2024</a:t>
             </a:fld>
             <a:endParaRPr lang="ru-RU"/>
           </a:p>
@@ -1369,7 +2296,7 @@
           <a:p>
             <a:fld id="{35D9EDF0-53A7-4816-A469-E6386F1496A0}" type="datetime1">
               <a:rPr lang="ru-RU" smtClean="0"/>
-              <a:t>21.05.2024</a:t>
+              <a:t>01.06.2024</a:t>
             </a:fld>
             <a:endParaRPr lang="ru-RU"/>
           </a:p>
@@ -1424,6 +2351,181 @@
     <p:extLst>
       <p:ext uri="{BB962C8B-B14F-4D97-AF65-F5344CB8AC3E}">
         <p14:creationId xmlns:p14="http://schemas.microsoft.com/office/powerpoint/2010/main" val="1796529830"/>
+      </p:ext>
+    </p:extLst>
+  </p:cSld>
+  <p:clrMapOvr>
+    <a:masterClrMapping/>
+  </p:clrMapOvr>
+</p:sldLayout>
+</file>
+
+<file path=ppt/slideLayouts/slideLayout12.xml><?xml version="1.0" encoding="utf-8"?>
+<p:sldLayout xmlns:a="http://schemas.openxmlformats.org/drawingml/2006/main" xmlns:r="http://schemas.openxmlformats.org/officeDocument/2006/relationships" xmlns:p="http://schemas.openxmlformats.org/presentationml/2006/main" type="obj">
+  <p:cSld name="1_Заголовок и объект">
+    <p:spTree>
+      <p:nvGrpSpPr>
+        <p:cNvPr id="1" name=""/>
+        <p:cNvGrpSpPr/>
+        <p:nvPr/>
+      </p:nvGrpSpPr>
+      <p:grpSpPr>
+        <a:xfrm>
+          <a:off x="0" y="0"/>
+          <a:ext cx="0" cy="0"/>
+          <a:chOff x="0" y="0"/>
+          <a:chExt cx="0" cy="0"/>
+        </a:xfrm>
+      </p:grpSpPr>
+      <p:sp>
+        <p:nvSpPr>
+          <p:cNvPr id="4" name="Date Placeholder 3"/>
+          <p:cNvSpPr>
+            <a:spLocks noGrp="1"/>
+          </p:cNvSpPr>
+          <p:nvPr>
+            <p:ph type="dt" sz="half" idx="10"/>
+          </p:nvPr>
+        </p:nvSpPr>
+        <p:spPr/>
+        <p:txBody>
+          <a:bodyPr/>
+          <a:lstStyle/>
+          <a:p>
+            <a:fld id="{F93A723B-5719-4EEA-B777-EAF3DA7FDF21}" type="datetimeFigureOut">
+              <a:rPr lang="ru-RU" smtClean="0"/>
+              <a:t>01.06.2024</a:t>
+            </a:fld>
+            <a:endParaRPr lang="ru-RU"/>
+          </a:p>
+        </p:txBody>
+      </p:sp>
+      <p:sp>
+        <p:nvSpPr>
+          <p:cNvPr id="5" name="Footer Placeholder 4"/>
+          <p:cNvSpPr>
+            <a:spLocks noGrp="1"/>
+          </p:cNvSpPr>
+          <p:nvPr>
+            <p:ph type="ftr" sz="quarter" idx="11"/>
+          </p:nvPr>
+        </p:nvSpPr>
+        <p:spPr/>
+        <p:txBody>
+          <a:bodyPr/>
+          <a:lstStyle/>
+          <a:p>
+            <a:endParaRPr lang="ru-RU"/>
+          </a:p>
+        </p:txBody>
+      </p:sp>
+      <p:sp>
+        <p:nvSpPr>
+          <p:cNvPr id="6" name="Slide Number Placeholder 5"/>
+          <p:cNvSpPr>
+            <a:spLocks noGrp="1"/>
+          </p:cNvSpPr>
+          <p:nvPr>
+            <p:ph type="sldNum" sz="quarter" idx="12"/>
+          </p:nvPr>
+        </p:nvSpPr>
+        <p:spPr/>
+        <p:txBody>
+          <a:bodyPr/>
+          <a:lstStyle/>
+          <a:p>
+            <a:fld id="{5004A5C1-EBA6-4D9B-83CC-431CB510693B}" type="slidenum">
+              <a:rPr lang="ru-RU" smtClean="0"/>
+              <a:t>‹#›</a:t>
+            </a:fld>
+            <a:endParaRPr lang="ru-RU"/>
+          </a:p>
+        </p:txBody>
+      </p:sp>
+      <p:sp>
+        <p:nvSpPr>
+          <p:cNvPr id="8" name="Title 7"/>
+          <p:cNvSpPr>
+            <a:spLocks noGrp="1"/>
+          </p:cNvSpPr>
+          <p:nvPr>
+            <p:ph type="title"/>
+          </p:nvPr>
+        </p:nvSpPr>
+        <p:spPr/>
+        <p:txBody>
+          <a:bodyPr/>
+          <a:lstStyle/>
+          <a:p>
+            <a:r>
+              <a:rPr lang="ru-RU"/>
+              <a:t>Образец заголовка</a:t>
+            </a:r>
+            <a:endParaRPr lang="en-US"/>
+          </a:p>
+        </p:txBody>
+      </p:sp>
+      <p:sp>
+        <p:nvSpPr>
+          <p:cNvPr id="10" name="Content Placeholder 9"/>
+          <p:cNvSpPr>
+            <a:spLocks noGrp="1"/>
+          </p:cNvSpPr>
+          <p:nvPr>
+            <p:ph sz="quarter" idx="13"/>
+          </p:nvPr>
+        </p:nvSpPr>
+        <p:spPr>
+          <a:xfrm>
+            <a:off x="1524000" y="731520"/>
+            <a:ext cx="8534400" cy="3474720"/>
+          </a:xfrm>
+        </p:spPr>
+        <p:txBody>
+          <a:bodyPr/>
+          <a:lstStyle/>
+          <a:p>
+            <a:pPr lvl="0"/>
+            <a:r>
+              <a:rPr lang="ru-RU"/>
+              <a:t>Образец текста</a:t>
+            </a:r>
+          </a:p>
+          <a:p>
+            <a:pPr lvl="1"/>
+            <a:r>
+              <a:rPr lang="ru-RU"/>
+              <a:t>Второй уровень</a:t>
+            </a:r>
+          </a:p>
+          <a:p>
+            <a:pPr lvl="2"/>
+            <a:r>
+              <a:rPr lang="ru-RU"/>
+              <a:t>Третий уровень</a:t>
+            </a:r>
+          </a:p>
+          <a:p>
+            <a:pPr lvl="3"/>
+            <a:r>
+              <a:rPr lang="ru-RU"/>
+              <a:t>Четвертый уровень</a:t>
+            </a:r>
+          </a:p>
+          <a:p>
+            <a:pPr lvl="4"/>
+            <a:r>
+              <a:rPr lang="ru-RU"/>
+              <a:t>Пятый уровень</a:t>
+            </a:r>
+            <a:endParaRPr lang="en-US" dirty="0"/>
+          </a:p>
+        </p:txBody>
+      </p:sp>
+    </p:spTree>
+    <p:extLst>
+      <p:ext uri="{BB962C8B-B14F-4D97-AF65-F5344CB8AC3E}">
+        <p14:creationId xmlns:p14="http://schemas.microsoft.com/office/powerpoint/2010/main" val="1896349556"/>
       </p:ext>
     </p:extLst>
   </p:cSld>
@@ -1542,7 +2644,7 @@
           <a:p>
             <a:fld id="{959B1456-FD82-4147-8449-EE75CB799A0B}" type="datetime1">
               <a:rPr lang="ru-RU" smtClean="0"/>
-              <a:t>21.05.2024</a:t>
+              <a:t>01.06.2024</a:t>
             </a:fld>
             <a:endParaRPr lang="ru-RU"/>
           </a:p>
@@ -1888,7 +2990,7 @@
           <a:p>
             <a:fld id="{1DE65392-87F2-440D-83A9-0FF80CCF3097}" type="datetime1">
               <a:rPr lang="ru-RU" smtClean="0"/>
-              <a:t>21.05.2024</a:t>
+              <a:t>01.06.2024</a:t>
             </a:fld>
             <a:endParaRPr lang="ru-RU"/>
           </a:p>
@@ -2166,7 +3268,7 @@
           <a:p>
             <a:fld id="{B2B2C348-0629-4735-A998-A94E5244B2FF}" type="datetime1">
               <a:rPr lang="ru-RU" smtClean="0"/>
-              <a:t>21.05.2024</a:t>
+              <a:t>01.06.2024</a:t>
             </a:fld>
             <a:endParaRPr lang="ru-RU"/>
           </a:p>
@@ -2548,7 +3650,7 @@
           <a:p>
             <a:fld id="{DD9BB28B-C6B2-4D28-8E80-A527174E3DF4}" type="datetime1">
               <a:rPr lang="ru-RU" smtClean="0"/>
-              <a:t>21.05.2024</a:t>
+              <a:t>01.06.2024</a:t>
             </a:fld>
             <a:endParaRPr lang="ru-RU"/>
           </a:p>
@@ -2669,7 +3771,7 @@
           <a:p>
             <a:fld id="{316A98F2-75DB-483C-9B37-48729AB1E125}" type="datetime1">
               <a:rPr lang="ru-RU" smtClean="0"/>
-              <a:t>21.05.2024</a:t>
+              <a:t>01.06.2024</a:t>
             </a:fld>
             <a:endParaRPr lang="ru-RU"/>
           </a:p>
@@ -2843,7 +3945,7 @@
           <a:p>
             <a:fld id="{8B6D05F9-4F9F-431B-90BE-5426A3ACFDCE}" type="datetime1">
               <a:rPr lang="ru-RU" smtClean="0"/>
-              <a:t>21.05.2024</a:t>
+              <a:t>01.06.2024</a:t>
             </a:fld>
             <a:endParaRPr lang="ru-RU"/>
           </a:p>
@@ -3200,7 +4302,7 @@
           <a:p>
             <a:fld id="{A09990F8-2E5A-4C7D-8F41-3C397A5146CD}" type="datetime1">
               <a:rPr lang="ru-RU" smtClean="0"/>
-              <a:t>21.05.2024</a:t>
+              <a:t>01.06.2024</a:t>
             </a:fld>
             <a:endParaRPr lang="ru-RU"/>
           </a:p>
@@ -3580,7 +4682,7 @@
           <a:p>
             <a:fld id="{C447921B-3498-462A-8076-73A93AB5686F}" type="datetime1">
               <a:rPr lang="ru-RU" smtClean="0"/>
-              <a:t>21.05.2024</a:t>
+              <a:t>01.06.2024</a:t>
             </a:fld>
             <a:endParaRPr lang="ru-RU"/>
           </a:p>
@@ -3871,7 +4973,7 @@
           <a:p>
             <a:fld id="{EB590D54-8E0D-45B1-B788-E604861CA3EE}" type="datetime1">
               <a:rPr lang="ru-RU" smtClean="0"/>
-              <a:t>21.05.2024</a:t>
+              <a:t>01.06.2024</a:t>
             </a:fld>
             <a:endParaRPr lang="ru-RU"/>
           </a:p>
@@ -4012,6 +5114,7 @@
     <p:sldLayoutId id="2147483747" r:id="rId9"/>
     <p:sldLayoutId id="2147483748" r:id="rId10"/>
     <p:sldLayoutId id="2147483749" r:id="rId11"/>
+    <p:sldLayoutId id="2147483750" r:id="rId12"/>
   </p:sldLayoutIdLst>
   <p:hf hdr="0" ftr="0" dt="0"/>
   <p:txStyles>
@@ -4571,7 +5674,7 @@
         <p:spPr>
           <a:xfrm>
             <a:off x="1097280" y="1919476"/>
-            <a:ext cx="7597541" cy="430887"/>
+            <a:ext cx="10115203" cy="430887"/>
           </a:xfrm>
           <a:prstGeom prst="rect">
             <a:avLst/>
@@ -4591,10 +5694,22 @@
               <a:t>Цель</a:t>
             </a:r>
             <a:r>
+              <a:rPr lang="en-US" sz="2200" b="1" dirty="0">
+                <a:latin typeface="+mj-lt"/>
+              </a:rPr>
+              <a:t> </a:t>
+            </a:r>
+            <a:r>
+              <a:rPr lang="ru-RU" sz="2200" b="1" dirty="0">
+                <a:latin typeface="+mj-lt"/>
+              </a:rPr>
+              <a:t>дипломного проектирования</a:t>
+            </a:r>
+            <a:r>
               <a:rPr lang="ru-RU" sz="2200" dirty="0">
                 <a:latin typeface="+mj-lt"/>
               </a:rPr>
-              <a:t>:  Разработать интернет–магазин «Сладости»</a:t>
+              <a:t>:  Разработка интернет–магазина «Сладости»</a:t>
             </a:r>
           </a:p>
         </p:txBody>
@@ -4631,7 +5746,7 @@
               <a:rPr lang="ru-RU" sz="2000" b="1" dirty="0">
                 <a:latin typeface="+mj-lt"/>
               </a:rPr>
-              <a:t>Задачи</a:t>
+              <a:t>Задачи дипломного проектирования</a:t>
             </a:r>
             <a:r>
               <a:rPr lang="ru-RU" sz="2000" dirty="0">
@@ -4709,11 +5824,14 @@
               <a:buChar char="ü"/>
             </a:pPr>
             <a:r>
-              <a:rPr lang="ru-RU" sz="2000" dirty="0">
+              <a:rPr lang="ru-RU" sz="2000">
                 <a:latin typeface="+mj-lt"/>
               </a:rPr>
-              <a:t>Провести проектирование.;</a:t>
-            </a:r>
+              <a:t>Провести проектирование;</a:t>
+            </a:r>
+            <a:endParaRPr lang="ru-RU" sz="2000" dirty="0">
+              <a:latin typeface="+mj-lt"/>
+            </a:endParaRPr>
           </a:p>
           <a:p>
             <a:pPr marL="285750" indent="-285750">
@@ -4775,10 +5893,10 @@
           <a:lstStyle/>
           <a:p>
             <a:fld id="{6117FFAF-1985-4180-A0D2-72FEAD882164}" type="slidenum">
-              <a:rPr lang="ru-RU" sz="1400" smtClean="0"/>
+              <a:rPr lang="ru-RU" sz="1800" smtClean="0"/>
               <a:t>2</a:t>
             </a:fld>
-            <a:endParaRPr lang="ru-RU" sz="1400" dirty="0"/>
+            <a:endParaRPr lang="ru-RU" sz="1800" dirty="0"/>
           </a:p>
         </p:txBody>
       </p:sp>
@@ -4814,7 +5932,13 @@
       </p:grpSpPr>
       <p:sp>
         <p:nvSpPr>
-          <p:cNvPr id="2" name="Заголовок 1"/>
+          <p:cNvPr id="2" name="Заголовок 1">
+            <a:extLst>
+              <a:ext uri="{FF2B5EF4-FFF2-40B4-BE49-F238E27FC236}">
+                <a16:creationId xmlns:a16="http://schemas.microsoft.com/office/drawing/2014/main" id="{884731A3-58BB-45EF-ACD3-271F832D0DA4}"/>
+              </a:ext>
+            </a:extLst>
+          </p:cNvPr>
           <p:cNvSpPr>
             <a:spLocks noGrp="1"/>
           </p:cNvSpPr>
@@ -4822,7 +5946,12 @@
             <p:ph type="title"/>
           </p:nvPr>
         </p:nvSpPr>
-        <p:spPr/>
+        <p:spPr>
+          <a:xfrm>
+            <a:off x="421954" y="-235758"/>
+            <a:ext cx="10058400" cy="873982"/>
+          </a:xfrm>
+        </p:spPr>
         <p:txBody>
           <a:bodyPr>
             <a:normAutofit/>
@@ -4830,18 +5959,679 @@
           <a:lstStyle/>
           <a:p>
             <a:r>
-              <a:rPr lang="ru-RU" sz="4000" dirty="0"/>
-              <a:t>ИСПОЛЬЗУЕМЫЕ ИНСТРУМЕНТЫ</a:t>
-            </a:r>
-          </a:p>
-        </p:txBody>
-      </p:sp>
+              <a:rPr lang="ru-RU" sz="3200" dirty="0"/>
+              <a:t>ИНСТРУМЕНТАЛЬНЫЕ</a:t>
+            </a:r>
+            <a:r>
+              <a:rPr lang="ru-RU" sz="3600" dirty="0"/>
+              <a:t> СРЕДСТВА </a:t>
+            </a:r>
+          </a:p>
+        </p:txBody>
+      </p:sp>
+      <p:sp>
+        <p:nvSpPr>
+          <p:cNvPr id="4" name="Номер слайда 3">
+            <a:extLst>
+              <a:ext uri="{FF2B5EF4-FFF2-40B4-BE49-F238E27FC236}">
+                <a16:creationId xmlns:a16="http://schemas.microsoft.com/office/drawing/2014/main" id="{8192FC07-A440-448C-9478-25F857B64525}"/>
+              </a:ext>
+            </a:extLst>
+          </p:cNvPr>
+          <p:cNvSpPr>
+            <a:spLocks noGrp="1"/>
+          </p:cNvSpPr>
+          <p:nvPr>
+            <p:ph type="sldNum" sz="quarter" idx="12"/>
+          </p:nvPr>
+        </p:nvSpPr>
+        <p:spPr/>
+        <p:txBody>
+          <a:bodyPr/>
+          <a:lstStyle/>
+          <a:p>
+            <a:fld id="{6117FFAF-1985-4180-A0D2-72FEAD882164}" type="slidenum">
+              <a:rPr lang="ru-RU" sz="1800" smtClean="0"/>
+              <a:t>3</a:t>
+            </a:fld>
+            <a:endParaRPr lang="ru-RU" sz="1800" dirty="0"/>
+          </a:p>
+        </p:txBody>
+      </p:sp>
+      <p:graphicFrame>
+        <p:nvGraphicFramePr>
+          <p:cNvPr id="5" name="Таблица 2">
+            <a:extLst>
+              <a:ext uri="{FF2B5EF4-FFF2-40B4-BE49-F238E27FC236}">
+                <a16:creationId xmlns:a16="http://schemas.microsoft.com/office/drawing/2014/main" id="{2AFF3710-FB73-4EF6-A466-66050B917F83}"/>
+              </a:ext>
+            </a:extLst>
+          </p:cNvPr>
+          <p:cNvGraphicFramePr>
+            <a:graphicFrameLocks noGrp="1"/>
+          </p:cNvGraphicFramePr>
+          <p:nvPr>
+            <p:ph idx="1"/>
+            <p:extLst>
+              <p:ext uri="{D42A27DB-BD31-4B8C-83A1-F6EECF244321}">
+                <p14:modId xmlns:p14="http://schemas.microsoft.com/office/powerpoint/2010/main" val="2933664965"/>
+              </p:ext>
+            </p:extLst>
+          </p:nvPr>
+        </p:nvGraphicFramePr>
+        <p:xfrm>
+          <a:off x="507679" y="638224"/>
+          <a:ext cx="10950896" cy="5584568"/>
+        </p:xfrm>
+        <a:graphic>
+          <a:graphicData uri="http://schemas.openxmlformats.org/drawingml/2006/table">
+            <a:tbl>
+              <a:tblPr firstRow="1" bandRow="1">
+                <a:tableStyleId>{21E4AEA4-8DFA-4A89-87EB-49C32662AFE0}</a:tableStyleId>
+              </a:tblPr>
+              <a:tblGrid>
+                <a:gridCol w="4059196">
+                  <a:extLst>
+                    <a:ext uri="{9D8B030D-6E8A-4147-A177-3AD203B41FA5}">
+                      <a16:colId xmlns:a16="http://schemas.microsoft.com/office/drawing/2014/main" val="489332136"/>
+                    </a:ext>
+                  </a:extLst>
+                </a:gridCol>
+                <a:gridCol w="3242937">
+                  <a:extLst>
+                    <a:ext uri="{9D8B030D-6E8A-4147-A177-3AD203B41FA5}">
+                      <a16:colId xmlns:a16="http://schemas.microsoft.com/office/drawing/2014/main" val="699667990"/>
+                    </a:ext>
+                  </a:extLst>
+                </a:gridCol>
+                <a:gridCol w="3648763">
+                  <a:extLst>
+                    <a:ext uri="{9D8B030D-6E8A-4147-A177-3AD203B41FA5}">
+                      <a16:colId xmlns:a16="http://schemas.microsoft.com/office/drawing/2014/main" val="359732992"/>
+                    </a:ext>
+                  </a:extLst>
+                </a:gridCol>
+              </a:tblGrid>
+              <a:tr h="618061">
+                <a:tc>
+                  <a:txBody>
+                    <a:bodyPr/>
+                    <a:lstStyle/>
+                    <a:p>
+                      <a:pPr algn="ctr"/>
+                      <a:r>
+                        <a:rPr lang="ru-RU" dirty="0">
+                          <a:latin typeface="Times New Roman" panose="02020603050405020304" pitchFamily="18" charset="0"/>
+                          <a:cs typeface="Times New Roman" panose="02020603050405020304" pitchFamily="18" charset="0"/>
+                        </a:rPr>
+                        <a:t>Этап</a:t>
+                      </a:r>
+                    </a:p>
+                  </a:txBody>
+                  <a:tcPr/>
+                </a:tc>
+                <a:tc>
+                  <a:txBody>
+                    <a:bodyPr/>
+                    <a:lstStyle/>
+                    <a:p>
+                      <a:pPr algn="ctr"/>
+                      <a:r>
+                        <a:rPr lang="ru-RU" dirty="0">
+                          <a:latin typeface="Times New Roman" panose="02020603050405020304" pitchFamily="18" charset="0"/>
+                          <a:cs typeface="Times New Roman" panose="02020603050405020304" pitchFamily="18" charset="0"/>
+                        </a:rPr>
+                        <a:t>Изображение (логотип)</a:t>
+                      </a:r>
+                    </a:p>
+                  </a:txBody>
+                  <a:tcPr/>
+                </a:tc>
+                <a:tc>
+                  <a:txBody>
+                    <a:bodyPr/>
+                    <a:lstStyle/>
+                    <a:p>
+                      <a:pPr algn="ctr"/>
+                      <a:r>
+                        <a:rPr lang="ru-RU" dirty="0">
+                          <a:latin typeface="Times New Roman" panose="02020603050405020304" pitchFamily="18" charset="0"/>
+                          <a:cs typeface="Times New Roman" panose="02020603050405020304" pitchFamily="18" charset="0"/>
+                        </a:rPr>
+                        <a:t>Название инструмента</a:t>
+                      </a:r>
+                    </a:p>
+                  </a:txBody>
+                  <a:tcPr/>
+                </a:tc>
+                <a:extLst>
+                  <a:ext uri="{0D108BD9-81ED-4DB2-BD59-A6C34878D82A}">
+                    <a16:rowId xmlns:a16="http://schemas.microsoft.com/office/drawing/2014/main" val="1615068126"/>
+                  </a:ext>
+                </a:extLst>
+              </a:tr>
+              <a:tr h="618061">
+                <a:tc>
+                  <a:txBody>
+                    <a:bodyPr/>
+                    <a:lstStyle/>
+                    <a:p>
+                      <a:pPr algn="ctr"/>
+                      <a:r>
+                        <a:rPr lang="ru-RU" dirty="0">
+                          <a:latin typeface="Times New Roman" panose="02020603050405020304" pitchFamily="18" charset="0"/>
+                          <a:cs typeface="Times New Roman" panose="02020603050405020304" pitchFamily="18" charset="0"/>
+                        </a:rPr>
+                        <a:t>Функциональное </a:t>
+                      </a:r>
+                      <a:r>
+                        <a:rPr lang="ru-RU" sz="1800" kern="1200" dirty="0">
+                          <a:solidFill>
+                            <a:schemeClr val="dk1"/>
+                          </a:solidFill>
+                          <a:latin typeface="Times New Roman" panose="02020603050405020304" pitchFamily="18" charset="0"/>
+                          <a:cs typeface="Times New Roman" panose="02020603050405020304" pitchFamily="18" charset="0"/>
+                        </a:rPr>
+                        <a:t>проектирование программного продукта</a:t>
+                      </a:r>
+                      <a:endParaRPr lang="ru-RU" sz="1800" kern="1200" dirty="0">
+                        <a:solidFill>
+                          <a:schemeClr val="dk1"/>
+                        </a:solidFill>
+                        <a:latin typeface="Times New Roman" panose="02020603050405020304" pitchFamily="18" charset="0"/>
+                        <a:ea typeface="+mn-ea"/>
+                        <a:cs typeface="Times New Roman" panose="02020603050405020304" pitchFamily="18" charset="0"/>
+                      </a:endParaRPr>
+                    </a:p>
+                  </a:txBody>
+                  <a:tcPr anchor="ctr"/>
+                </a:tc>
+                <a:tc>
+                  <a:txBody>
+                    <a:bodyPr/>
+                    <a:lstStyle/>
+                    <a:p>
+                      <a:pPr algn="ctr"/>
+                      <a:endParaRPr lang="ru-RU" dirty="0">
+                        <a:latin typeface="Times New Roman" panose="02020603050405020304" pitchFamily="18" charset="0"/>
+                        <a:cs typeface="Times New Roman" panose="02020603050405020304" pitchFamily="18" charset="0"/>
+                      </a:endParaRPr>
+                    </a:p>
+                  </a:txBody>
+                  <a:tcPr/>
+                </a:tc>
+                <a:tc>
+                  <a:txBody>
+                    <a:bodyPr/>
+                    <a:lstStyle/>
+                    <a:p>
+                      <a:pPr algn="ctr"/>
+                      <a:r>
+                        <a:rPr lang="en-US" dirty="0">
+                          <a:latin typeface="Times New Roman" panose="02020603050405020304" pitchFamily="18" charset="0"/>
+                          <a:cs typeface="Times New Roman" panose="02020603050405020304" pitchFamily="18" charset="0"/>
+                        </a:rPr>
+                        <a:t>Draw.io</a:t>
+                      </a:r>
+                      <a:endParaRPr lang="ru-RU" dirty="0">
+                        <a:latin typeface="Times New Roman" panose="02020603050405020304" pitchFamily="18" charset="0"/>
+                        <a:cs typeface="Times New Roman" panose="02020603050405020304" pitchFamily="18" charset="0"/>
+                      </a:endParaRPr>
+                    </a:p>
+                  </a:txBody>
+                  <a:tcPr anchor="ctr"/>
+                </a:tc>
+                <a:extLst>
+                  <a:ext uri="{0D108BD9-81ED-4DB2-BD59-A6C34878D82A}">
+                    <a16:rowId xmlns:a16="http://schemas.microsoft.com/office/drawing/2014/main" val="2334190659"/>
+                  </a:ext>
+                </a:extLst>
+              </a:tr>
+              <a:tr h="618061">
+                <a:tc>
+                  <a:txBody>
+                    <a:bodyPr/>
+                    <a:lstStyle/>
+                    <a:p>
+                      <a:pPr algn="ctr"/>
+                      <a:r>
+                        <a:rPr lang="ru-RU" dirty="0">
+                          <a:latin typeface="Times New Roman" panose="02020603050405020304" pitchFamily="18" charset="0"/>
+                          <a:cs typeface="Times New Roman" panose="02020603050405020304" pitchFamily="18" charset="0"/>
+                        </a:rPr>
+                        <a:t>Проектирование базы данных</a:t>
+                      </a:r>
+                    </a:p>
+                  </a:txBody>
+                  <a:tcPr anchor="ctr"/>
+                </a:tc>
+                <a:tc>
+                  <a:txBody>
+                    <a:bodyPr/>
+                    <a:lstStyle/>
+                    <a:p>
+                      <a:pPr algn="ctr"/>
+                      <a:endParaRPr lang="ru-RU" dirty="0">
+                        <a:latin typeface="Times New Roman" panose="02020603050405020304" pitchFamily="18" charset="0"/>
+                        <a:cs typeface="Times New Roman" panose="02020603050405020304" pitchFamily="18" charset="0"/>
+                      </a:endParaRPr>
+                    </a:p>
+                  </a:txBody>
+                  <a:tcPr/>
+                </a:tc>
+                <a:tc>
+                  <a:txBody>
+                    <a:bodyPr/>
+                    <a:lstStyle/>
+                    <a:p>
+                      <a:pPr algn="ctr"/>
+                      <a:r>
+                        <a:rPr lang="en-US" dirty="0" err="1">
+                          <a:latin typeface="Times New Roman" panose="02020603050405020304" pitchFamily="18" charset="0"/>
+                          <a:cs typeface="Times New Roman" panose="02020603050405020304" pitchFamily="18" charset="0"/>
+                        </a:rPr>
+                        <a:t>QuickDBD</a:t>
+                      </a:r>
+                      <a:endParaRPr lang="ru-RU" dirty="0">
+                        <a:latin typeface="Times New Roman" panose="02020603050405020304" pitchFamily="18" charset="0"/>
+                        <a:cs typeface="Times New Roman" panose="02020603050405020304" pitchFamily="18" charset="0"/>
+                      </a:endParaRPr>
+                    </a:p>
+                  </a:txBody>
+                  <a:tcPr anchor="ctr"/>
+                </a:tc>
+                <a:extLst>
+                  <a:ext uri="{0D108BD9-81ED-4DB2-BD59-A6C34878D82A}">
+                    <a16:rowId xmlns:a16="http://schemas.microsoft.com/office/drawing/2014/main" val="2595179013"/>
+                  </a:ext>
+                </a:extLst>
+              </a:tr>
+              <a:tr h="618061">
+                <a:tc>
+                  <a:txBody>
+                    <a:bodyPr/>
+                    <a:lstStyle/>
+                    <a:p>
+                      <a:pPr algn="ctr"/>
+                      <a:r>
+                        <a:rPr lang="ru-RU" dirty="0">
+                          <a:latin typeface="Times New Roman" panose="02020603050405020304" pitchFamily="18" charset="0"/>
+                          <a:cs typeface="Times New Roman" panose="02020603050405020304" pitchFamily="18" charset="0"/>
+                        </a:rPr>
+                        <a:t>Реализация базы данных</a:t>
+                      </a:r>
+                    </a:p>
+                  </a:txBody>
+                  <a:tcPr anchor="ctr"/>
+                </a:tc>
+                <a:tc>
+                  <a:txBody>
+                    <a:bodyPr/>
+                    <a:lstStyle/>
+                    <a:p>
+                      <a:pPr algn="ctr"/>
+                      <a:endParaRPr lang="ru-RU" dirty="0">
+                        <a:latin typeface="Times New Roman" panose="02020603050405020304" pitchFamily="18" charset="0"/>
+                        <a:cs typeface="Times New Roman" panose="02020603050405020304" pitchFamily="18" charset="0"/>
+                      </a:endParaRPr>
+                    </a:p>
+                  </a:txBody>
+                  <a:tcPr/>
+                </a:tc>
+                <a:tc>
+                  <a:txBody>
+                    <a:bodyPr/>
+                    <a:lstStyle/>
+                    <a:p>
+                      <a:pPr algn="ctr"/>
+                      <a:r>
+                        <a:rPr lang="en-US" dirty="0">
+                          <a:latin typeface="Times New Roman" panose="02020603050405020304" pitchFamily="18" charset="0"/>
+                          <a:cs typeface="Times New Roman" panose="02020603050405020304" pitchFamily="18" charset="0"/>
+                        </a:rPr>
+                        <a:t>MongoDB</a:t>
+                      </a:r>
+                      <a:endParaRPr lang="ru-RU" dirty="0">
+                        <a:latin typeface="Times New Roman" panose="02020603050405020304" pitchFamily="18" charset="0"/>
+                        <a:cs typeface="Times New Roman" panose="02020603050405020304" pitchFamily="18" charset="0"/>
+                      </a:endParaRPr>
+                    </a:p>
+                  </a:txBody>
+                  <a:tcPr anchor="ctr"/>
+                </a:tc>
+                <a:extLst>
+                  <a:ext uri="{0D108BD9-81ED-4DB2-BD59-A6C34878D82A}">
+                    <a16:rowId xmlns:a16="http://schemas.microsoft.com/office/drawing/2014/main" val="3941248937"/>
+                  </a:ext>
+                </a:extLst>
+              </a:tr>
+              <a:tr h="618061">
+                <a:tc>
+                  <a:txBody>
+                    <a:bodyPr/>
+                    <a:lstStyle/>
+                    <a:p>
+                      <a:pPr algn="ctr"/>
+                      <a:r>
+                        <a:rPr lang="ru-RU" dirty="0">
+                          <a:latin typeface="Times New Roman" panose="02020603050405020304" pitchFamily="18" charset="0"/>
+                          <a:cs typeface="Times New Roman" panose="02020603050405020304" pitchFamily="18" charset="0"/>
+                        </a:rPr>
+                        <a:t>Проектирование интерфейса</a:t>
+                      </a:r>
+                    </a:p>
+                  </a:txBody>
+                  <a:tcPr anchor="ctr"/>
+                </a:tc>
+                <a:tc>
+                  <a:txBody>
+                    <a:bodyPr/>
+                    <a:lstStyle/>
+                    <a:p>
+                      <a:pPr algn="ctr"/>
+                      <a:endParaRPr lang="ru-RU" dirty="0">
+                        <a:latin typeface="Times New Roman" panose="02020603050405020304" pitchFamily="18" charset="0"/>
+                        <a:cs typeface="Times New Roman" panose="02020603050405020304" pitchFamily="18" charset="0"/>
+                      </a:endParaRPr>
+                    </a:p>
+                  </a:txBody>
+                  <a:tcPr/>
+                </a:tc>
+                <a:tc>
+                  <a:txBody>
+                    <a:bodyPr/>
+                    <a:lstStyle/>
+                    <a:p>
+                      <a:pPr algn="ctr"/>
+                      <a:r>
+                        <a:rPr lang="en-US" dirty="0">
+                          <a:latin typeface="Times New Roman" panose="02020603050405020304" pitchFamily="18" charset="0"/>
+                          <a:cs typeface="Times New Roman" panose="02020603050405020304" pitchFamily="18" charset="0"/>
+                        </a:rPr>
+                        <a:t>Figma</a:t>
+                      </a:r>
+                      <a:endParaRPr lang="ru-RU" dirty="0">
+                        <a:latin typeface="Times New Roman" panose="02020603050405020304" pitchFamily="18" charset="0"/>
+                        <a:cs typeface="Times New Roman" panose="02020603050405020304" pitchFamily="18" charset="0"/>
+                      </a:endParaRPr>
+                    </a:p>
+                  </a:txBody>
+                  <a:tcPr anchor="ctr"/>
+                </a:tc>
+                <a:extLst>
+                  <a:ext uri="{0D108BD9-81ED-4DB2-BD59-A6C34878D82A}">
+                    <a16:rowId xmlns:a16="http://schemas.microsoft.com/office/drawing/2014/main" val="2510060549"/>
+                  </a:ext>
+                </a:extLst>
+              </a:tr>
+              <a:tr h="618061">
+                <a:tc>
+                  <a:txBody>
+                    <a:bodyPr/>
+                    <a:lstStyle/>
+                    <a:p>
+                      <a:pPr algn="ctr"/>
+                      <a:r>
+                        <a:rPr lang="ru-RU" dirty="0">
+                          <a:latin typeface="Times New Roman" panose="02020603050405020304" pitchFamily="18" charset="0"/>
+                          <a:cs typeface="Times New Roman" panose="02020603050405020304" pitchFamily="18" charset="0"/>
+                        </a:rPr>
+                        <a:t>Реализация (среда разработки)</a:t>
+                      </a:r>
+                    </a:p>
+                  </a:txBody>
+                  <a:tcPr anchor="ctr"/>
+                </a:tc>
+                <a:tc>
+                  <a:txBody>
+                    <a:bodyPr/>
+                    <a:lstStyle/>
+                    <a:p>
+                      <a:pPr algn="ctr"/>
+                      <a:endParaRPr lang="ru-RU" dirty="0">
+                        <a:latin typeface="Times New Roman" panose="02020603050405020304" pitchFamily="18" charset="0"/>
+                        <a:cs typeface="Times New Roman" panose="02020603050405020304" pitchFamily="18" charset="0"/>
+                      </a:endParaRPr>
+                    </a:p>
+                  </a:txBody>
+                  <a:tcPr/>
+                </a:tc>
+                <a:tc>
+                  <a:txBody>
+                    <a:bodyPr/>
+                    <a:lstStyle/>
+                    <a:p>
+                      <a:pPr algn="ctr"/>
+                      <a:r>
+                        <a:rPr lang="en-US" dirty="0">
+                          <a:latin typeface="Times New Roman" panose="02020603050405020304" pitchFamily="18" charset="0"/>
+                          <a:cs typeface="Times New Roman" panose="02020603050405020304" pitchFamily="18" charset="0"/>
+                        </a:rPr>
+                        <a:t>Visual Studio Code</a:t>
+                      </a:r>
+                      <a:endParaRPr lang="ru-RU" dirty="0">
+                        <a:latin typeface="Times New Roman" panose="02020603050405020304" pitchFamily="18" charset="0"/>
+                        <a:cs typeface="Times New Roman" panose="02020603050405020304" pitchFamily="18" charset="0"/>
+                      </a:endParaRPr>
+                    </a:p>
+                  </a:txBody>
+                  <a:tcPr anchor="ctr"/>
+                </a:tc>
+                <a:extLst>
+                  <a:ext uri="{0D108BD9-81ED-4DB2-BD59-A6C34878D82A}">
+                    <a16:rowId xmlns:a16="http://schemas.microsoft.com/office/drawing/2014/main" val="2948600580"/>
+                  </a:ext>
+                </a:extLst>
+              </a:tr>
+              <a:tr h="618061">
+                <a:tc>
+                  <a:txBody>
+                    <a:bodyPr/>
+                    <a:lstStyle/>
+                    <a:p>
+                      <a:pPr algn="ctr"/>
+                      <a:r>
+                        <a:rPr lang="ru-RU" dirty="0">
+                          <a:latin typeface="Times New Roman" panose="02020603050405020304" pitchFamily="18" charset="0"/>
+                          <a:cs typeface="Times New Roman" panose="02020603050405020304" pitchFamily="18" charset="0"/>
+                        </a:rPr>
+                        <a:t>Реализация (инструменты, языки)</a:t>
+                      </a:r>
+                    </a:p>
+                  </a:txBody>
+                  <a:tcPr anchor="ctr"/>
+                </a:tc>
+                <a:tc>
+                  <a:txBody>
+                    <a:bodyPr/>
+                    <a:lstStyle/>
+                    <a:p>
+                      <a:pPr algn="ctr"/>
+                      <a:endParaRPr lang="ru-RU" dirty="0">
+                        <a:latin typeface="Times New Roman" panose="02020603050405020304" pitchFamily="18" charset="0"/>
+                        <a:cs typeface="Times New Roman" panose="02020603050405020304" pitchFamily="18" charset="0"/>
+                      </a:endParaRPr>
+                    </a:p>
+                  </a:txBody>
+                  <a:tcPr/>
+                </a:tc>
+                <a:tc>
+                  <a:txBody>
+                    <a:bodyPr/>
+                    <a:lstStyle/>
+                    <a:p>
+                      <a:pPr algn="ctr"/>
+                      <a:r>
+                        <a:rPr lang="en-US" dirty="0">
+                          <a:latin typeface="Times New Roman" panose="02020603050405020304" pitchFamily="18" charset="0"/>
+                          <a:cs typeface="Times New Roman" panose="02020603050405020304" pitchFamily="18" charset="0"/>
+                        </a:rPr>
+                        <a:t>HTML, CSS, JavaScript</a:t>
+                      </a:r>
+                      <a:endParaRPr lang="ru-RU" dirty="0">
+                        <a:latin typeface="Times New Roman" panose="02020603050405020304" pitchFamily="18" charset="0"/>
+                        <a:cs typeface="Times New Roman" panose="02020603050405020304" pitchFamily="18" charset="0"/>
+                      </a:endParaRPr>
+                    </a:p>
+                  </a:txBody>
+                  <a:tcPr anchor="ctr"/>
+                </a:tc>
+                <a:extLst>
+                  <a:ext uri="{0D108BD9-81ED-4DB2-BD59-A6C34878D82A}">
+                    <a16:rowId xmlns:a16="http://schemas.microsoft.com/office/drawing/2014/main" val="183050000"/>
+                  </a:ext>
+                </a:extLst>
+              </a:tr>
+              <a:tr h="618061">
+                <a:tc>
+                  <a:txBody>
+                    <a:bodyPr/>
+                    <a:lstStyle/>
+                    <a:p>
+                      <a:pPr marL="0" marR="0" lvl="0" indent="0" algn="ctr" defTabSz="914400" rtl="0" eaLnBrk="1" fontAlgn="auto" latinLnBrk="0" hangingPunct="1">
+                        <a:lnSpc>
+                          <a:spcPct val="100000"/>
+                        </a:lnSpc>
+                        <a:spcBef>
+                          <a:spcPts val="0"/>
+                        </a:spcBef>
+                        <a:spcAft>
+                          <a:spcPts val="0"/>
+                        </a:spcAft>
+                        <a:buClrTx/>
+                        <a:buSzTx/>
+                        <a:buFontTx/>
+                        <a:buNone/>
+                        <a:tabLst/>
+                        <a:defRPr/>
+                      </a:pPr>
+                      <a:r>
+                        <a:rPr lang="ru-RU" dirty="0">
+                          <a:latin typeface="Times New Roman" panose="02020603050405020304" pitchFamily="18" charset="0"/>
+                          <a:cs typeface="Times New Roman" panose="02020603050405020304" pitchFamily="18" charset="0"/>
+                        </a:rPr>
+                        <a:t>Разработка (фреймворки, библиотеки)</a:t>
+                      </a:r>
+                    </a:p>
+                  </a:txBody>
+                  <a:tcPr anchor="ctr"/>
+                </a:tc>
+                <a:tc>
+                  <a:txBody>
+                    <a:bodyPr/>
+                    <a:lstStyle/>
+                    <a:p>
+                      <a:pPr algn="ctr"/>
+                      <a:endParaRPr lang="ru-RU" dirty="0">
+                        <a:latin typeface="Times New Roman" panose="02020603050405020304" pitchFamily="18" charset="0"/>
+                        <a:cs typeface="Times New Roman" panose="02020603050405020304" pitchFamily="18" charset="0"/>
+                      </a:endParaRPr>
+                    </a:p>
+                  </a:txBody>
+                  <a:tcPr/>
+                </a:tc>
+                <a:tc>
+                  <a:txBody>
+                    <a:bodyPr/>
+                    <a:lstStyle/>
+                    <a:p>
+                      <a:pPr algn="ctr"/>
+                      <a:r>
+                        <a:rPr lang="en-US" dirty="0">
+                          <a:latin typeface="Times New Roman" panose="02020603050405020304" pitchFamily="18" charset="0"/>
+                          <a:cs typeface="Times New Roman" panose="02020603050405020304" pitchFamily="18" charset="0"/>
+                        </a:rPr>
+                        <a:t>React, Express</a:t>
+                      </a:r>
+                      <a:endParaRPr lang="ru-RU" dirty="0">
+                        <a:latin typeface="Times New Roman" panose="02020603050405020304" pitchFamily="18" charset="0"/>
+                        <a:cs typeface="Times New Roman" panose="02020603050405020304" pitchFamily="18" charset="0"/>
+                      </a:endParaRPr>
+                    </a:p>
+                  </a:txBody>
+                  <a:tcPr anchor="ctr"/>
+                </a:tc>
+                <a:extLst>
+                  <a:ext uri="{0D108BD9-81ED-4DB2-BD59-A6C34878D82A}">
+                    <a16:rowId xmlns:a16="http://schemas.microsoft.com/office/drawing/2014/main" val="3308350619"/>
+                  </a:ext>
+                </a:extLst>
+              </a:tr>
+              <a:tr h="618061">
+                <a:tc>
+                  <a:txBody>
+                    <a:bodyPr/>
+                    <a:lstStyle/>
+                    <a:p>
+                      <a:pPr algn="ctr"/>
+                      <a:r>
+                        <a:rPr lang="ru-RU" dirty="0">
+                          <a:latin typeface="Times New Roman" panose="02020603050405020304" pitchFamily="18" charset="0"/>
+                          <a:cs typeface="Times New Roman" panose="02020603050405020304" pitchFamily="18" charset="0"/>
+                        </a:rPr>
+                        <a:t>Тестирование</a:t>
+                      </a:r>
+                    </a:p>
+                  </a:txBody>
+                  <a:tcPr anchor="ctr"/>
+                </a:tc>
+                <a:tc>
+                  <a:txBody>
+                    <a:bodyPr/>
+                    <a:lstStyle/>
+                    <a:p>
+                      <a:pPr algn="ctr"/>
+                      <a:endParaRPr lang="ru-RU" dirty="0">
+                        <a:latin typeface="Times New Roman" panose="02020603050405020304" pitchFamily="18" charset="0"/>
+                        <a:cs typeface="Times New Roman" panose="02020603050405020304" pitchFamily="18" charset="0"/>
+                      </a:endParaRPr>
+                    </a:p>
+                  </a:txBody>
+                  <a:tcPr/>
+                </a:tc>
+                <a:tc>
+                  <a:txBody>
+                    <a:bodyPr/>
+                    <a:lstStyle/>
+                    <a:p>
+                      <a:pPr algn="ctr">
+                        <a:lnSpc>
+                          <a:spcPct val="100000"/>
+                        </a:lnSpc>
+                        <a:spcBef>
+                          <a:spcPts val="500"/>
+                        </a:spcBef>
+                        <a:spcAft>
+                          <a:spcPts val="500"/>
+                        </a:spcAft>
+                      </a:pPr>
+                      <a:r>
+                        <a:rPr lang="en-US" dirty="0">
+                          <a:latin typeface="Times New Roman" panose="02020603050405020304" pitchFamily="18" charset="0"/>
+                          <a:cs typeface="Times New Roman" panose="02020603050405020304" pitchFamily="18" charset="0"/>
+                        </a:rPr>
+                        <a:t>Chai, Mocha</a:t>
+                      </a:r>
+                    </a:p>
+                  </a:txBody>
+                  <a:tcPr anchor="ctr"/>
+                </a:tc>
+                <a:extLst>
+                  <a:ext uri="{0D108BD9-81ED-4DB2-BD59-A6C34878D82A}">
+                    <a16:rowId xmlns:a16="http://schemas.microsoft.com/office/drawing/2014/main" val="2630927718"/>
+                  </a:ext>
+                </a:extLst>
+              </a:tr>
+            </a:tbl>
+          </a:graphicData>
+        </a:graphic>
+      </p:graphicFrame>
       <p:pic>
         <p:nvPicPr>
-          <p:cNvPr id="15" name="Picture 26" descr="Figma SVG Vector Logos - Vector Logo Zone">
+          <p:cNvPr id="3" name="Picture 2" descr="Picture background">
             <a:extLst>
               <a:ext uri="{FF2B5EF4-FFF2-40B4-BE49-F238E27FC236}">
-                <a16:creationId xmlns:a16="http://schemas.microsoft.com/office/drawing/2014/main" id="{A3FDD000-ACD7-4196-92F6-3B00BD590DA3}"/>
+                <a16:creationId xmlns:a16="http://schemas.microsoft.com/office/drawing/2014/main" id="{92A3A047-E248-C6E1-9F9D-C92CE404076A}"/>
               </a:ext>
             </a:extLst>
           </p:cNvPr>
@@ -4851,7 +6641,7 @@
           <p:nvPr/>
         </p:nvPicPr>
         <p:blipFill>
-          <a:blip r:embed="rId2" cstate="print">
+          <a:blip r:embed="rId3">
             <a:extLst>
               <a:ext uri="{28A0092B-C50C-407E-A947-70E740481C1C}">
                 <a14:useLocalDpi xmlns:a14="http://schemas.microsoft.com/office/drawing/2010/main" val="0"/>
@@ -4865,8 +6655,8 @@
         </p:blipFill>
         <p:spPr bwMode="auto">
           <a:xfrm>
-            <a:off x="724371" y="2566101"/>
-            <a:ext cx="1550862" cy="775431"/>
+            <a:off x="5962845" y="3777102"/>
+            <a:ext cx="613801" cy="613801"/>
           </a:xfrm>
           <a:prstGeom prst="rect">
             <a:avLst/>
@@ -4885,198 +6675,99 @@
       </p:pic>
       <p:pic>
         <p:nvPicPr>
-          <p:cNvPr id="16" name="Picture 30" descr="Draw.io Logo PNG Vector (SVG) Free Download">
+          <p:cNvPr id="14" name="Рисунок 13">
             <a:extLst>
               <a:ext uri="{FF2B5EF4-FFF2-40B4-BE49-F238E27FC236}">
-                <a16:creationId xmlns:a16="http://schemas.microsoft.com/office/drawing/2014/main" id="{CE5A56CB-A047-463C-9F69-5C05BB63ECFE}"/>
+                <a16:creationId xmlns:a16="http://schemas.microsoft.com/office/drawing/2014/main" id="{44DD61B8-A2C2-2A4B-26C9-A3C6B8F975AE}"/>
               </a:ext>
             </a:extLst>
           </p:cNvPr>
           <p:cNvPicPr>
-            <a:picLocks noChangeAspect="1" noChangeArrowheads="1"/>
+            <a:picLocks noChangeAspect="1"/>
           </p:cNvPicPr>
           <p:nvPr/>
         </p:nvPicPr>
         <p:blipFill>
-          <a:blip r:embed="rId3" cstate="print">
-            <a:extLst>
-              <a:ext uri="{28A0092B-C50C-407E-A947-70E740481C1C}">
-                <a14:useLocalDpi xmlns:a14="http://schemas.microsoft.com/office/drawing/2010/main" val="0"/>
-              </a:ext>
-            </a:extLst>
-          </a:blip>
-          <a:srcRect/>
+          <a:blip r:embed="rId4"/>
           <a:stretch>
             <a:fillRect/>
           </a:stretch>
         </p:blipFill>
-        <p:spPr bwMode="auto">
+        <p:spPr>
           <a:xfrm>
-            <a:off x="2548934" y="2418415"/>
-            <a:ext cx="740466" cy="996143"/>
+            <a:off x="5999368" y="3176478"/>
+            <a:ext cx="513832" cy="508059"/>
           </a:xfrm>
           <a:prstGeom prst="rect">
             <a:avLst/>
           </a:prstGeom>
-          <a:noFill/>
-          <a:extLst>
-            <a:ext uri="{909E8E84-426E-40DD-AFC4-6F175D3DCCD1}">
-              <a14:hiddenFill xmlns:a14="http://schemas.microsoft.com/office/drawing/2010/main">
-                <a:solidFill>
-                  <a:srgbClr val="FFFFFF"/>
-                </a:solidFill>
-              </a14:hiddenFill>
-            </a:ext>
-          </a:extLst>
         </p:spPr>
       </p:pic>
       <p:pic>
         <p:nvPicPr>
-          <p:cNvPr id="17" name="Picture 10" descr="React SVG Vector Logos - Vector Logo Zone">
+          <p:cNvPr id="15" name="Рисунок 14">
             <a:extLst>
               <a:ext uri="{FF2B5EF4-FFF2-40B4-BE49-F238E27FC236}">
-                <a16:creationId xmlns:a16="http://schemas.microsoft.com/office/drawing/2014/main" id="{0D086ED6-A866-46D4-A713-3CF01F868D0C}"/>
+                <a16:creationId xmlns:a16="http://schemas.microsoft.com/office/drawing/2014/main" id="{AB0D299B-BE5C-C18B-A8FE-58A4FCAEF78C}"/>
               </a:ext>
             </a:extLst>
           </p:cNvPr>
           <p:cNvPicPr>
-            <a:picLocks noChangeAspect="1" noChangeArrowheads="1"/>
+            <a:picLocks noChangeAspect="1"/>
           </p:cNvPicPr>
           <p:nvPr/>
         </p:nvPicPr>
         <p:blipFill>
-          <a:blip r:embed="rId4" cstate="print">
+          <a:blip r:embed="rId5"/>
+          <a:srcRect/>
+          <a:stretch/>
+        </p:blipFill>
+        <p:spPr>
+          <a:xfrm>
+            <a:off x="5945202" y="1310274"/>
+            <a:ext cx="518901" cy="518901"/>
+          </a:xfrm>
+          <a:prstGeom prst="rect">
+            <a:avLst/>
+          </a:prstGeom>
+        </p:spPr>
+      </p:pic>
+      <p:pic>
+        <p:nvPicPr>
+          <p:cNvPr id="18" name="Рисунок 17">
             <a:extLst>
-              <a:ext uri="{28A0092B-C50C-407E-A947-70E740481C1C}">
-                <a14:useLocalDpi xmlns:a14="http://schemas.microsoft.com/office/drawing/2010/main" val="0"/>
+              <a:ext uri="{FF2B5EF4-FFF2-40B4-BE49-F238E27FC236}">
+                <a16:creationId xmlns:a16="http://schemas.microsoft.com/office/drawing/2014/main" id="{145567E7-C840-3F37-08A3-DD0E418664CC}"/>
               </a:ext>
             </a:extLst>
-          </a:blip>
-          <a:srcRect/>
+          </p:cNvPr>
+          <p:cNvPicPr>
+            <a:picLocks noChangeAspect="1"/>
+          </p:cNvPicPr>
+          <p:nvPr/>
+        </p:nvPicPr>
+        <p:blipFill>
+          <a:blip r:embed="rId6"/>
           <a:stretch>
             <a:fillRect/>
           </a:stretch>
         </p:blipFill>
-        <p:spPr bwMode="auto">
+        <p:spPr>
           <a:xfrm>
-            <a:off x="3768479" y="5061323"/>
-            <a:ext cx="1974170" cy="987085"/>
+            <a:off x="5758559" y="5061738"/>
+            <a:ext cx="408572" cy="454432"/>
           </a:xfrm>
           <a:prstGeom prst="rect">
             <a:avLst/>
           </a:prstGeom>
-          <a:noFill/>
-          <a:extLst>
-            <a:ext uri="{909E8E84-426E-40DD-AFC4-6F175D3DCCD1}">
-              <a14:hiddenFill xmlns:a14="http://schemas.microsoft.com/office/drawing/2010/main">
-                <a:solidFill>
-                  <a:srgbClr val="FFFFFF"/>
-                </a:solidFill>
-              </a14:hiddenFill>
-            </a:ext>
-          </a:extLst>
         </p:spPr>
       </p:pic>
       <p:pic>
         <p:nvPicPr>
-          <p:cNvPr id="18" name="Picture 4" descr="HTML5 SVG Vector Logos - Vector Logo Zone">
+          <p:cNvPr id="19" name="Picture 10" descr="Picture background">
             <a:extLst>
               <a:ext uri="{FF2B5EF4-FFF2-40B4-BE49-F238E27FC236}">
-                <a16:creationId xmlns:a16="http://schemas.microsoft.com/office/drawing/2014/main" id="{ACA97E7E-D4A3-4FEE-AA64-D48552B7FB54}"/>
-              </a:ext>
-            </a:extLst>
-          </p:cNvPr>
-          <p:cNvPicPr>
-            <a:picLocks noChangeAspect="1" noChangeArrowheads="1"/>
-          </p:cNvPicPr>
-          <p:nvPr/>
-        </p:nvPicPr>
-        <p:blipFill>
-          <a:blip r:embed="rId5" cstate="print">
-            <a:extLst>
-              <a:ext uri="{28A0092B-C50C-407E-A947-70E740481C1C}">
-                <a14:useLocalDpi xmlns:a14="http://schemas.microsoft.com/office/drawing/2010/main" val="0"/>
-              </a:ext>
-            </a:extLst>
-          </a:blip>
-          <a:srcRect/>
-          <a:stretch>
-            <a:fillRect/>
-          </a:stretch>
-        </p:blipFill>
-        <p:spPr bwMode="auto">
-          <a:xfrm>
-            <a:off x="1860965" y="4051683"/>
-            <a:ext cx="1607350" cy="803675"/>
-          </a:xfrm>
-          <a:prstGeom prst="rect">
-            <a:avLst/>
-          </a:prstGeom>
-          <a:noFill/>
-          <a:extLst>
-            <a:ext uri="{909E8E84-426E-40DD-AFC4-6F175D3DCCD1}">
-              <a14:hiddenFill xmlns:a14="http://schemas.microsoft.com/office/drawing/2010/main">
-                <a:solidFill>
-                  <a:srgbClr val="FFFFFF"/>
-                </a:solidFill>
-              </a14:hiddenFill>
-            </a:ext>
-          </a:extLst>
-        </p:spPr>
-      </p:pic>
-      <p:pic>
-        <p:nvPicPr>
-          <p:cNvPr id="19" name="Picture 6" descr="CSS SVG Vector Logos - Vector Logo Zone">
-            <a:extLst>
-              <a:ext uri="{FF2B5EF4-FFF2-40B4-BE49-F238E27FC236}">
-                <a16:creationId xmlns:a16="http://schemas.microsoft.com/office/drawing/2014/main" id="{2DD770C9-B37A-4A4A-B982-D1712C04EC27}"/>
-              </a:ext>
-            </a:extLst>
-          </p:cNvPr>
-          <p:cNvPicPr>
-            <a:picLocks noChangeAspect="1" noChangeArrowheads="1"/>
-          </p:cNvPicPr>
-          <p:nvPr/>
-        </p:nvPicPr>
-        <p:blipFill>
-          <a:blip r:embed="rId6" cstate="print">
-            <a:extLst>
-              <a:ext uri="{28A0092B-C50C-407E-A947-70E740481C1C}">
-                <a14:useLocalDpi xmlns:a14="http://schemas.microsoft.com/office/drawing/2010/main" val="0"/>
-              </a:ext>
-            </a:extLst>
-          </a:blip>
-          <a:srcRect/>
-          <a:stretch>
-            <a:fillRect/>
-          </a:stretch>
-        </p:blipFill>
-        <p:spPr bwMode="auto">
-          <a:xfrm>
-            <a:off x="3883569" y="4040119"/>
-            <a:ext cx="1630480" cy="815240"/>
-          </a:xfrm>
-          <a:prstGeom prst="rect">
-            <a:avLst/>
-          </a:prstGeom>
-          <a:noFill/>
-          <a:extLst>
-            <a:ext uri="{909E8E84-426E-40DD-AFC4-6F175D3DCCD1}">
-              <a14:hiddenFill xmlns:a14="http://schemas.microsoft.com/office/drawing/2010/main">
-                <a:solidFill>
-                  <a:srgbClr val="FFFFFF"/>
-                </a:solidFill>
-              </a14:hiddenFill>
-            </a:ext>
-          </a:extLst>
-        </p:spPr>
-      </p:pic>
-      <p:pic>
-        <p:nvPicPr>
-          <p:cNvPr id="20" name="Picture 2">
-            <a:extLst>
-              <a:ext uri="{FF2B5EF4-FFF2-40B4-BE49-F238E27FC236}">
-                <a16:creationId xmlns:a16="http://schemas.microsoft.com/office/drawing/2014/main" id="{34DB5F1E-D6CD-4732-83D9-B67F55AFA8E0}"/>
+                <a16:creationId xmlns:a16="http://schemas.microsoft.com/office/drawing/2014/main" id="{457A4CAF-AEA2-495D-0BA8-B900171FCE1F}"/>
               </a:ext>
             </a:extLst>
           </p:cNvPr>
@@ -5100,8 +6791,8 @@
         </p:blipFill>
         <p:spPr bwMode="auto">
           <a:xfrm>
-            <a:off x="2519325" y="5061323"/>
-            <a:ext cx="776732" cy="776732"/>
+            <a:off x="6696664" y="4375403"/>
+            <a:ext cx="613801" cy="613801"/>
           </a:xfrm>
           <a:prstGeom prst="rect">
             <a:avLst/>
@@ -5120,10 +6811,10 @@
       </p:pic>
       <p:pic>
         <p:nvPicPr>
-          <p:cNvPr id="21" name="Picture 12">
+          <p:cNvPr id="21" name="Picture 20">
             <a:extLst>
               <a:ext uri="{FF2B5EF4-FFF2-40B4-BE49-F238E27FC236}">
-                <a16:creationId xmlns:a16="http://schemas.microsoft.com/office/drawing/2014/main" id="{467F9DFF-75EB-4849-9FE1-52AE0C7B904D}"/>
+                <a16:creationId xmlns:a16="http://schemas.microsoft.com/office/drawing/2014/main" id="{17A2BD51-1490-7503-90B7-57A8ABFE4CBF}"/>
               </a:ext>
             </a:extLst>
           </p:cNvPr>
@@ -5133,7 +6824,7 @@
           <p:nvPr/>
         </p:nvPicPr>
         <p:blipFill>
-          <a:blip r:embed="rId8" cstate="print">
+          <a:blip r:embed="rId8">
             <a:extLst>
               <a:ext uri="{28A0092B-C50C-407E-A947-70E740481C1C}">
                 <a14:useLocalDpi xmlns:a14="http://schemas.microsoft.com/office/drawing/2010/main" val="0"/>
@@ -5147,8 +6838,8 @@
         </p:blipFill>
         <p:spPr bwMode="auto">
           <a:xfrm>
-            <a:off x="6953531" y="2415910"/>
-            <a:ext cx="2521481" cy="677648"/>
+            <a:off x="9907608" y="10791648"/>
+            <a:ext cx="150775" cy="45719"/>
           </a:xfrm>
           <a:prstGeom prst="rect">
             <a:avLst/>
@@ -5167,10 +6858,10 @@
       </p:pic>
       <p:pic>
         <p:nvPicPr>
-          <p:cNvPr id="22" name="Picture 20">
+          <p:cNvPr id="1034" name="Picture 10" descr="Picture background">
             <a:extLst>
               <a:ext uri="{FF2B5EF4-FFF2-40B4-BE49-F238E27FC236}">
-                <a16:creationId xmlns:a16="http://schemas.microsoft.com/office/drawing/2014/main" id="{ED5D9FED-3AAF-4F79-A50A-FD35F6F7CA46}"/>
+                <a16:creationId xmlns:a16="http://schemas.microsoft.com/office/drawing/2014/main" id="{101B6E14-9A49-84C5-A3F0-B5166055EE04}"/>
               </a:ext>
             </a:extLst>
           </p:cNvPr>
@@ -5194,8 +6885,8 @@
         </p:blipFill>
         <p:spPr bwMode="auto">
           <a:xfrm>
-            <a:off x="9646762" y="2455402"/>
-            <a:ext cx="1974318" cy="598664"/>
+            <a:off x="6285984" y="5083554"/>
+            <a:ext cx="454432" cy="454432"/>
           </a:xfrm>
           <a:prstGeom prst="rect">
             <a:avLst/>
@@ -5214,14 +6905,20 @@
       </p:pic>
       <p:pic>
         <p:nvPicPr>
-          <p:cNvPr id="23" name="Picture 8" descr="https://g.foolcdn.com/image/?url=https%3A//g.foolcdn.com/editorial/images/475641/mdb-logo.png&amp;w=2000&amp;op=resize"/>
+          <p:cNvPr id="1038" name="Picture 14" descr="Picture background">
+            <a:extLst>
+              <a:ext uri="{FF2B5EF4-FFF2-40B4-BE49-F238E27FC236}">
+                <a16:creationId xmlns:a16="http://schemas.microsoft.com/office/drawing/2014/main" id="{D389CE47-9B75-4523-CC19-28CA093F591B}"/>
+              </a:ext>
+            </a:extLst>
+          </p:cNvPr>
           <p:cNvPicPr>
             <a:picLocks noChangeAspect="1" noChangeArrowheads="1"/>
           </p:cNvPicPr>
           <p:nvPr/>
         </p:nvPicPr>
         <p:blipFill>
-          <a:blip r:embed="rId10" cstate="print">
+          <a:blip r:embed="rId10">
             <a:extLst>
               <a:ext uri="{28A0092B-C50C-407E-A947-70E740481C1C}">
                 <a14:useLocalDpi xmlns:a14="http://schemas.microsoft.com/office/drawing/2010/main" val="0"/>
@@ -5235,8 +6932,8 @@
         </p:blipFill>
         <p:spPr bwMode="auto">
           <a:xfrm>
-            <a:off x="8423522" y="3328892"/>
-            <a:ext cx="2102980" cy="841192"/>
+            <a:off x="5600641" y="2639592"/>
+            <a:ext cx="1208022" cy="325600"/>
           </a:xfrm>
           <a:prstGeom prst="rect">
             <a:avLst/>
@@ -5253,41 +6950,102 @@
           </a:extLst>
         </p:spPr>
       </p:pic>
-      <p:sp>
-        <p:nvSpPr>
-          <p:cNvPr id="4" name="Номер слайда 3">
+      <p:pic>
+        <p:nvPicPr>
+          <p:cNvPr id="24" name="Рисунок 23">
             <a:extLst>
               <a:ext uri="{FF2B5EF4-FFF2-40B4-BE49-F238E27FC236}">
-                <a16:creationId xmlns:a16="http://schemas.microsoft.com/office/drawing/2014/main" id="{B7E76902-C7BD-4C4B-9244-74AE21C86DF2}"/>
+                <a16:creationId xmlns:a16="http://schemas.microsoft.com/office/drawing/2014/main" id="{94D48978-1DD6-4D87-FB87-26E1A238E7CB}"/>
               </a:ext>
             </a:extLst>
           </p:cNvPr>
-          <p:cNvSpPr>
-            <a:spLocks noGrp="1"/>
-          </p:cNvSpPr>
-          <p:nvPr>
-            <p:ph type="sldNum" sz="quarter" idx="12"/>
-          </p:nvPr>
-        </p:nvSpPr>
-        <p:spPr/>
-        <p:txBody>
-          <a:bodyPr/>
-          <a:lstStyle/>
-          <a:p>
-            <a:fld id="{6117FFAF-1985-4180-A0D2-72FEAD882164}" type="slidenum">
-              <a:rPr lang="ru-RU" sz="1400" smtClean="0"/>
-              <a:t>3</a:t>
-            </a:fld>
-            <a:endParaRPr lang="ru-RU" sz="1400"/>
-          </a:p>
-        </p:txBody>
-      </p:sp>
+          <p:cNvPicPr>
+            <a:picLocks noChangeAspect="1"/>
+          </p:cNvPicPr>
+          <p:nvPr/>
+        </p:nvPicPr>
+        <p:blipFill>
+          <a:blip r:embed="rId11"/>
+          <a:stretch>
+            <a:fillRect/>
+          </a:stretch>
+        </p:blipFill>
+        <p:spPr>
+          <a:xfrm>
+            <a:off x="5962845" y="2010147"/>
+            <a:ext cx="485843" cy="447737"/>
+          </a:xfrm>
+          <a:prstGeom prst="rect">
+            <a:avLst/>
+          </a:prstGeom>
+        </p:spPr>
+      </p:pic>
       <p:pic>
         <p:nvPicPr>
-          <p:cNvPr id="1026" name="Picture 2" descr="Picture background">
+          <p:cNvPr id="25" name="Рисунок 24" descr="Изображение выглядит как красный, символ, апельсин, дизайн&#10;&#10;Автоматически созданное описание">
             <a:extLst>
               <a:ext uri="{FF2B5EF4-FFF2-40B4-BE49-F238E27FC236}">
-                <a16:creationId xmlns:a16="http://schemas.microsoft.com/office/drawing/2014/main" id="{E8CD734D-B851-480B-AE58-51BB40A0A621}"/>
+                <a16:creationId xmlns:a16="http://schemas.microsoft.com/office/drawing/2014/main" id="{12349BD8-D65A-AD1F-C9E6-63A770DC88DB}"/>
+              </a:ext>
+            </a:extLst>
+          </p:cNvPr>
+          <p:cNvPicPr>
+            <a:picLocks noChangeAspect="1"/>
+          </p:cNvPicPr>
+          <p:nvPr/>
+        </p:nvPicPr>
+        <p:blipFill>
+          <a:blip r:embed="rId12"/>
+          <a:stretch>
+            <a:fillRect/>
+          </a:stretch>
+        </p:blipFill>
+        <p:spPr>
+          <a:xfrm>
+            <a:off x="4865926" y="4335252"/>
+            <a:ext cx="1036414" cy="583554"/>
+          </a:xfrm>
+          <a:prstGeom prst="rect">
+            <a:avLst/>
+          </a:prstGeom>
+        </p:spPr>
+      </p:pic>
+      <p:pic>
+        <p:nvPicPr>
+          <p:cNvPr id="26" name="Рисунок 25" descr="https://mscolnick.gallerycdn.vsassets.io/extensions/mscolnick/css-variables/0.1.0/1606441215994/Microsoft.VisualStudio.Services.Icons.Default">
+            <a:extLst>
+              <a:ext uri="{FF2B5EF4-FFF2-40B4-BE49-F238E27FC236}">
+                <a16:creationId xmlns:a16="http://schemas.microsoft.com/office/drawing/2014/main" id="{84659819-0AB0-1306-EA95-85FAE92914B4}"/>
+              </a:ext>
+            </a:extLst>
+          </p:cNvPr>
+          <p:cNvPicPr>
+            <a:picLocks noChangeAspect="1"/>
+          </p:cNvPicPr>
+          <p:nvPr/>
+        </p:nvPicPr>
+        <p:blipFill>
+          <a:blip r:embed="rId13"/>
+          <a:stretch>
+            <a:fillRect/>
+          </a:stretch>
+        </p:blipFill>
+        <p:spPr>
+          <a:xfrm>
+            <a:off x="5945202" y="4390903"/>
+            <a:ext cx="611928" cy="623190"/>
+          </a:xfrm>
+          <a:prstGeom prst="rect">
+            <a:avLst/>
+          </a:prstGeom>
+        </p:spPr>
+      </p:pic>
+      <p:pic>
+        <p:nvPicPr>
+          <p:cNvPr id="1040" name="Picture 16" descr="Picture background">
+            <a:extLst>
+              <a:ext uri="{FF2B5EF4-FFF2-40B4-BE49-F238E27FC236}">
+                <a16:creationId xmlns:a16="http://schemas.microsoft.com/office/drawing/2014/main" id="{820A54CA-BBAE-3253-2ACC-404A98B2F91A}"/>
               </a:ext>
             </a:extLst>
           </p:cNvPr>
@@ -5297,7 +7055,7 @@
           <p:nvPr/>
         </p:nvPicPr>
         <p:blipFill>
-          <a:blip r:embed="rId11">
+          <a:blip r:embed="rId14">
             <a:extLst>
               <a:ext uri="{28A0092B-C50C-407E-A947-70E740481C1C}">
                 <a14:useLocalDpi xmlns:a14="http://schemas.microsoft.com/office/drawing/2010/main" val="0"/>
@@ -5311,8 +7069,8 @@
         </p:blipFill>
         <p:spPr bwMode="auto">
           <a:xfrm>
-            <a:off x="6677953" y="4510748"/>
-            <a:ext cx="1101149" cy="1101149"/>
+            <a:off x="5489911" y="5611457"/>
+            <a:ext cx="1516478" cy="631866"/>
           </a:xfrm>
           <a:prstGeom prst="rect">
             <a:avLst/>
@@ -5332,7 +7090,7 @@
     </p:spTree>
     <p:extLst>
       <p:ext uri="{BB962C8B-B14F-4D97-AF65-F5344CB8AC3E}">
-        <p14:creationId xmlns:p14="http://schemas.microsoft.com/office/powerpoint/2010/main" val="593466408"/>
+        <p14:creationId xmlns:p14="http://schemas.microsoft.com/office/powerpoint/2010/main" val="2817390849"/>
       </p:ext>
     </p:extLst>
   </p:cSld>
@@ -5361,18 +7119,47 @@
       </p:grpSpPr>
       <p:sp>
         <p:nvSpPr>
+          <p:cNvPr id="6" name="Номер слайда 5">
+            <a:extLst>
+              <a:ext uri="{FF2B5EF4-FFF2-40B4-BE49-F238E27FC236}">
+                <a16:creationId xmlns:a16="http://schemas.microsoft.com/office/drawing/2014/main" id="{FC22A434-5464-4095-9280-6CCC8E7884C7}"/>
+              </a:ext>
+            </a:extLst>
+          </p:cNvPr>
+          <p:cNvSpPr>
+            <a:spLocks noGrp="1"/>
+          </p:cNvSpPr>
+          <p:nvPr>
+            <p:ph type="sldNum" sz="quarter" idx="12"/>
+          </p:nvPr>
+        </p:nvSpPr>
+        <p:spPr/>
+        <p:txBody>
+          <a:bodyPr/>
+          <a:lstStyle/>
+          <a:p>
+            <a:fld id="{6117FFAF-1985-4180-A0D2-72FEAD882164}" type="slidenum">
+              <a:rPr lang="ru-RU" sz="1800" smtClean="0"/>
+              <a:t>4</a:t>
+            </a:fld>
+            <a:endParaRPr lang="ru-RU" sz="1800" dirty="0"/>
+          </a:p>
+        </p:txBody>
+      </p:sp>
+      <p:sp>
+        <p:nvSpPr>
           <p:cNvPr id="2" name="Заголовок 1"/>
           <p:cNvSpPr>
             <a:spLocks noGrp="1"/>
           </p:cNvSpPr>
           <p:nvPr>
-            <p:ph type="title"/>
+            <p:ph type="title" idx="4294967295"/>
           </p:nvPr>
         </p:nvSpPr>
         <p:spPr>
           <a:xfrm>
-            <a:off x="1097280" y="286603"/>
-            <a:ext cx="10389870" cy="1450757"/>
+            <a:off x="1061671" y="261938"/>
+            <a:ext cx="10390187" cy="746125"/>
           </a:xfrm>
         </p:spPr>
         <p:txBody>
@@ -5394,20 +7181,28 @@
       </p:sp>
       <p:pic>
         <p:nvPicPr>
-          <p:cNvPr id="5" name="Рисунок 4"/>
-          <p:cNvPicPr/>
+          <p:cNvPr id="5" name="Рисунок 4">
+            <a:extLst>
+              <a:ext uri="{FF2B5EF4-FFF2-40B4-BE49-F238E27FC236}">
+                <a16:creationId xmlns:a16="http://schemas.microsoft.com/office/drawing/2014/main" id="{6AFDCBC6-C3CD-8377-7323-A9503B69E5CD}"/>
+              </a:ext>
+            </a:extLst>
+          </p:cNvPr>
+          <p:cNvPicPr>
+            <a:picLocks noChangeAspect="1"/>
+          </p:cNvPicPr>
           <p:nvPr/>
         </p:nvPicPr>
         <p:blipFill>
-          <a:blip r:embed="rId2"/>
+          <a:blip r:embed="rId3"/>
           <a:stretch>
             <a:fillRect/>
           </a:stretch>
         </p:blipFill>
         <p:spPr>
           <a:xfrm>
-            <a:off x="1123631" y="1940568"/>
-            <a:ext cx="5277169" cy="4109576"/>
+            <a:off x="1061671" y="1101848"/>
+            <a:ext cx="10068658" cy="5075426"/>
           </a:xfrm>
           <a:prstGeom prst="rect">
             <a:avLst/>
@@ -5419,35 +7214,6 @@
           </a:ln>
         </p:spPr>
       </p:pic>
-      <p:sp>
-        <p:nvSpPr>
-          <p:cNvPr id="6" name="Номер слайда 5">
-            <a:extLst>
-              <a:ext uri="{FF2B5EF4-FFF2-40B4-BE49-F238E27FC236}">
-                <a16:creationId xmlns:a16="http://schemas.microsoft.com/office/drawing/2014/main" id="{FC22A434-5464-4095-9280-6CCC8E7884C7}"/>
-              </a:ext>
-            </a:extLst>
-          </p:cNvPr>
-          <p:cNvSpPr>
-            <a:spLocks noGrp="1"/>
-          </p:cNvSpPr>
-          <p:nvPr>
-            <p:ph type="sldNum" sz="quarter" idx="12"/>
-          </p:nvPr>
-        </p:nvSpPr>
-        <p:spPr/>
-        <p:txBody>
-          <a:bodyPr/>
-          <a:lstStyle/>
-          <a:p>
-            <a:fld id="{6117FFAF-1985-4180-A0D2-72FEAD882164}" type="slidenum">
-              <a:rPr lang="ru-RU" sz="1400" smtClean="0"/>
-              <a:t>4</a:t>
-            </a:fld>
-            <a:endParaRPr lang="ru-RU" sz="1400" dirty="0"/>
-          </a:p>
-        </p:txBody>
-      </p:sp>
     </p:spTree>
     <p:extLst>
       <p:ext uri="{BB962C8B-B14F-4D97-AF65-F5344CB8AC3E}">
@@ -5500,10 +7266,10 @@
           <a:lstStyle/>
           <a:p>
             <a:fld id="{6117FFAF-1985-4180-A0D2-72FEAD882164}" type="slidenum">
-              <a:rPr lang="ru-RU" sz="1400" smtClean="0"/>
+              <a:rPr lang="ru-RU" sz="1800" smtClean="0"/>
               <a:t>5</a:t>
             </a:fld>
-            <a:endParaRPr lang="ru-RU" sz="1400"/>
+            <a:endParaRPr lang="ru-RU" sz="1800" dirty="0"/>
           </a:p>
         </p:txBody>
       </p:sp>
@@ -5523,8 +7289,159 @@
         </p:nvSpPr>
         <p:spPr>
           <a:xfrm>
-            <a:off x="4433787" y="408335"/>
-            <a:ext cx="2720741" cy="962526"/>
+            <a:off x="2633987" y="408335"/>
+            <a:ext cx="6924024" cy="962526"/>
+          </a:xfrm>
+          <a:prstGeom prst="rect">
+            <a:avLst/>
+          </a:prstGeom>
+        </p:spPr>
+        <p:txBody>
+          <a:bodyPr>
+            <a:normAutofit fontScale="92500"/>
+          </a:bodyPr>
+          <a:lstStyle>
+            <a:lvl1pPr algn="l" defTabSz="914400" rtl="0" eaLnBrk="1" latinLnBrk="0" hangingPunct="1">
+              <a:lnSpc>
+                <a:spcPct val="85000"/>
+              </a:lnSpc>
+              <a:spcBef>
+                <a:spcPct val="0"/>
+              </a:spcBef>
+              <a:buNone/>
+              <a:defRPr sz="4800" kern="1200" spc="-50" baseline="0">
+                <a:solidFill>
+                  <a:schemeClr val="tx1">
+                    <a:lumMod val="75000"/>
+                    <a:lumOff val="25000"/>
+                  </a:schemeClr>
+                </a:solidFill>
+                <a:latin typeface="+mj-lt"/>
+                <a:ea typeface="+mj-ea"/>
+                <a:cs typeface="+mj-cs"/>
+              </a:defRPr>
+            </a:lvl1pPr>
+          </a:lstStyle>
+          <a:p>
+            <a:r>
+              <a:rPr lang="ru-RU" sz="4000" dirty="0"/>
+              <a:t>Проектирование схемы навигации</a:t>
+            </a:r>
+          </a:p>
+        </p:txBody>
+      </p:sp>
+      <p:pic>
+        <p:nvPicPr>
+          <p:cNvPr id="5" name="Рисунок 4">
+            <a:extLst>
+              <a:ext uri="{FF2B5EF4-FFF2-40B4-BE49-F238E27FC236}">
+                <a16:creationId xmlns:a16="http://schemas.microsoft.com/office/drawing/2014/main" id="{BC59C752-B539-4A43-AA6B-9B84BCCDEFB7}"/>
+              </a:ext>
+            </a:extLst>
+          </p:cNvPr>
+          <p:cNvPicPr>
+            <a:picLocks noChangeAspect="1"/>
+          </p:cNvPicPr>
+          <p:nvPr/>
+        </p:nvPicPr>
+        <p:blipFill>
+          <a:blip r:embed="rId3"/>
+          <a:stretch>
+            <a:fillRect/>
+          </a:stretch>
+        </p:blipFill>
+        <p:spPr>
+          <a:xfrm>
+            <a:off x="127754" y="1370861"/>
+            <a:ext cx="11936491" cy="4353533"/>
+          </a:xfrm>
+          <a:prstGeom prst="rect">
+            <a:avLst/>
+          </a:prstGeom>
+          <a:ln>
+            <a:solidFill>
+              <a:schemeClr val="tx1"/>
+            </a:solidFill>
+          </a:ln>
+        </p:spPr>
+      </p:pic>
+    </p:spTree>
+    <p:extLst>
+      <p:ext uri="{BB962C8B-B14F-4D97-AF65-F5344CB8AC3E}">
+        <p14:creationId xmlns:p14="http://schemas.microsoft.com/office/powerpoint/2010/main" val="2738709802"/>
+      </p:ext>
+    </p:extLst>
+  </p:cSld>
+  <p:clrMapOvr>
+    <a:masterClrMapping/>
+  </p:clrMapOvr>
+</p:sld>
+</file>
+
+<file path=ppt/slides/slide6.xml><?xml version="1.0" encoding="utf-8"?>
+<p:sld xmlns:a="http://schemas.openxmlformats.org/drawingml/2006/main" xmlns:r="http://schemas.openxmlformats.org/officeDocument/2006/relationships" xmlns:p="http://schemas.openxmlformats.org/presentationml/2006/main">
+  <p:cSld>
+    <p:spTree>
+      <p:nvGrpSpPr>
+        <p:cNvPr id="1" name=""/>
+        <p:cNvGrpSpPr/>
+        <p:nvPr/>
+      </p:nvGrpSpPr>
+      <p:grpSpPr>
+        <a:xfrm>
+          <a:off x="0" y="0"/>
+          <a:ext cx="0" cy="0"/>
+          <a:chOff x="0" y="0"/>
+          <a:chExt cx="0" cy="0"/>
+        </a:xfrm>
+      </p:grpSpPr>
+      <p:sp>
+        <p:nvSpPr>
+          <p:cNvPr id="2" name="Номер слайда 1">
+            <a:extLst>
+              <a:ext uri="{FF2B5EF4-FFF2-40B4-BE49-F238E27FC236}">
+                <a16:creationId xmlns:a16="http://schemas.microsoft.com/office/drawing/2014/main" id="{348E4A36-80DA-7493-B017-B9C813C7234A}"/>
+              </a:ext>
+            </a:extLst>
+          </p:cNvPr>
+          <p:cNvSpPr>
+            <a:spLocks noGrp="1"/>
+          </p:cNvSpPr>
+          <p:nvPr>
+            <p:ph type="sldNum" sz="quarter" idx="12"/>
+          </p:nvPr>
+        </p:nvSpPr>
+        <p:spPr/>
+        <p:txBody>
+          <a:bodyPr/>
+          <a:lstStyle/>
+          <a:p>
+            <a:fld id="{6117FFAF-1985-4180-A0D2-72FEAD882164}" type="slidenum">
+              <a:rPr lang="ru-RU" sz="1800" smtClean="0"/>
+              <a:t>6</a:t>
+            </a:fld>
+            <a:endParaRPr lang="ru-RU" sz="1800"/>
+          </a:p>
+        </p:txBody>
+      </p:sp>
+      <p:sp>
+        <p:nvSpPr>
+          <p:cNvPr id="3" name="Заголовок 1">
+            <a:extLst>
+              <a:ext uri="{FF2B5EF4-FFF2-40B4-BE49-F238E27FC236}">
+                <a16:creationId xmlns:a16="http://schemas.microsoft.com/office/drawing/2014/main" id="{99C2F73F-2390-BFEC-6696-EF91779CEBF6}"/>
+              </a:ext>
+            </a:extLst>
+          </p:cNvPr>
+          <p:cNvSpPr txBox="1">
+            <a:spLocks/>
+          </p:cNvSpPr>
+          <p:nvPr/>
+        </p:nvSpPr>
+        <p:spPr>
+          <a:xfrm>
+            <a:off x="2376365" y="2760167"/>
+            <a:ext cx="8836118" cy="962526"/>
           </a:xfrm>
           <a:prstGeom prst="rect">
             <a:avLst/>
@@ -5558,51 +7475,809 @@
           </a:lstStyle>
           <a:p>
             <a:r>
-              <a:rPr lang="ru-RU" sz="4000" dirty="0"/>
-              <a:t>Карта сайта</a:t>
-            </a:r>
-          </a:p>
-        </p:txBody>
-      </p:sp>
-      <p:pic>
-        <p:nvPicPr>
-          <p:cNvPr id="5" name="Рисунок 4">
+              <a:rPr lang="ru-RU" sz="3600" dirty="0">
+                <a:solidFill>
+                  <a:schemeClr val="tx1">
+                    <a:lumMod val="85000"/>
+                    <a:lumOff val="15000"/>
+                  </a:schemeClr>
+                </a:solidFill>
+                <a:latin typeface="Arial" panose="020B0604020202020204" pitchFamily="34" charset="0"/>
+                <a:cs typeface="Arial" panose="020B0604020202020204" pitchFamily="34" charset="0"/>
+              </a:rPr>
+              <a:t>Демонстрация дипломного продукта</a:t>
+            </a:r>
+            <a:endParaRPr lang="ru-RU" sz="4000" dirty="0">
+              <a:solidFill>
+                <a:schemeClr val="tx1">
+                  <a:lumMod val="85000"/>
+                  <a:lumOff val="15000"/>
+                </a:schemeClr>
+              </a:solidFill>
+            </a:endParaRPr>
+          </a:p>
+        </p:txBody>
+      </p:sp>
+    </p:spTree>
+    <p:extLst>
+      <p:ext uri="{BB962C8B-B14F-4D97-AF65-F5344CB8AC3E}">
+        <p14:creationId xmlns:p14="http://schemas.microsoft.com/office/powerpoint/2010/main" val="3837399299"/>
+      </p:ext>
+    </p:extLst>
+  </p:cSld>
+  <p:clrMapOvr>
+    <a:masterClrMapping/>
+  </p:clrMapOvr>
+</p:sld>
+</file>
+
+<file path=ppt/slides/slide7.xml><?xml version="1.0" encoding="utf-8"?>
+<p:sld xmlns:a="http://schemas.openxmlformats.org/drawingml/2006/main" xmlns:r="http://schemas.openxmlformats.org/officeDocument/2006/relationships" xmlns:p="http://schemas.openxmlformats.org/presentationml/2006/main">
+  <p:cSld>
+    <p:spTree>
+      <p:nvGrpSpPr>
+        <p:cNvPr id="1" name=""/>
+        <p:cNvGrpSpPr/>
+        <p:nvPr/>
+      </p:nvGrpSpPr>
+      <p:grpSpPr>
+        <a:xfrm>
+          <a:off x="0" y="0"/>
+          <a:ext cx="0" cy="0"/>
+          <a:chOff x="0" y="0"/>
+          <a:chExt cx="0" cy="0"/>
+        </a:xfrm>
+      </p:grpSpPr>
+      <p:sp>
+        <p:nvSpPr>
+          <p:cNvPr id="4" name="Заголовок 4">
             <a:extLst>
               <a:ext uri="{FF2B5EF4-FFF2-40B4-BE49-F238E27FC236}">
-                <a16:creationId xmlns:a16="http://schemas.microsoft.com/office/drawing/2014/main" id="{BC59C752-B539-4A43-AA6B-9B84BCCDEFB7}"/>
+                <a16:creationId xmlns:a16="http://schemas.microsoft.com/office/drawing/2014/main" id="{03DB970B-9C80-46DC-8E32-7C5FC8006705}"/>
               </a:ext>
             </a:extLst>
           </p:cNvPr>
-          <p:cNvPicPr>
-            <a:picLocks noChangeAspect="1"/>
-          </p:cNvPicPr>
-          <p:nvPr/>
-        </p:nvPicPr>
-        <p:blipFill>
-          <a:blip r:embed="rId2"/>
-          <a:stretch>
-            <a:fillRect/>
-          </a:stretch>
-        </p:blipFill>
+          <p:cNvSpPr>
+            <a:spLocks noGrp="1"/>
+          </p:cNvSpPr>
+          <p:nvPr>
+            <p:ph type="title"/>
+          </p:nvPr>
+        </p:nvSpPr>
         <p:spPr>
           <a:xfrm>
-            <a:off x="127754" y="1370861"/>
-            <a:ext cx="11936491" cy="4353533"/>
+            <a:off x="3811744" y="60095"/>
+            <a:ext cx="4183501" cy="544100"/>
           </a:xfrm>
-          <a:prstGeom prst="rect">
-            <a:avLst/>
-          </a:prstGeom>
-          <a:ln>
-            <a:solidFill>
-              <a:schemeClr val="tx1"/>
-            </a:solidFill>
-          </a:ln>
         </p:spPr>
-      </p:pic>
+        <p:txBody>
+          <a:bodyPr>
+            <a:normAutofit/>
+          </a:bodyPr>
+          <a:lstStyle/>
+          <a:p>
+            <a:pPr marL="0" indent="0" algn="ctr">
+              <a:buNone/>
+            </a:pPr>
+            <a:r>
+              <a:rPr lang="ru-RU" sz="2800" b="1" dirty="0">
+                <a:solidFill>
+                  <a:schemeClr val="tx1">
+                    <a:lumMod val="85000"/>
+                    <a:lumOff val="15000"/>
+                  </a:schemeClr>
+                </a:solidFill>
+                <a:latin typeface="Arial" panose="020B0604020202020204" pitchFamily="34" charset="0"/>
+                <a:cs typeface="Arial" panose="020B0604020202020204" pitchFamily="34" charset="0"/>
+              </a:rPr>
+              <a:t>Вывод</a:t>
+            </a:r>
+            <a:endParaRPr lang="ru-RU" sz="3200" b="1" dirty="0">
+              <a:solidFill>
+                <a:schemeClr val="tx1">
+                  <a:lumMod val="85000"/>
+                  <a:lumOff val="15000"/>
+                </a:schemeClr>
+              </a:solidFill>
+              <a:latin typeface="Arial" panose="020B0604020202020204" pitchFamily="34" charset="0"/>
+              <a:cs typeface="Arial" panose="020B0604020202020204" pitchFamily="34" charset="0"/>
+            </a:endParaRPr>
+          </a:p>
+        </p:txBody>
+      </p:sp>
+      <p:graphicFrame>
+        <p:nvGraphicFramePr>
+          <p:cNvPr id="3" name="Таблица 2">
+            <a:extLst>
+              <a:ext uri="{FF2B5EF4-FFF2-40B4-BE49-F238E27FC236}">
+                <a16:creationId xmlns:a16="http://schemas.microsoft.com/office/drawing/2014/main" id="{6F3AF087-7F16-4D4B-BE0E-647816F638C1}"/>
+              </a:ext>
+            </a:extLst>
+          </p:cNvPr>
+          <p:cNvGraphicFramePr>
+            <a:graphicFrameLocks noGrp="1"/>
+          </p:cNvGraphicFramePr>
+          <p:nvPr>
+            <p:extLst>
+              <p:ext uri="{D42A27DB-BD31-4B8C-83A1-F6EECF244321}">
+                <p14:modId xmlns:p14="http://schemas.microsoft.com/office/powerpoint/2010/main" val="2288325386"/>
+              </p:ext>
+            </p:extLst>
+          </p:nvPr>
+        </p:nvGraphicFramePr>
+        <p:xfrm>
+          <a:off x="385011" y="772626"/>
+          <a:ext cx="11309684" cy="5304087"/>
+        </p:xfrm>
+        <a:graphic>
+          <a:graphicData uri="http://schemas.openxmlformats.org/drawingml/2006/table">
+            <a:tbl>
+              <a:tblPr firstRow="1" bandRow="1">
+                <a:tableStyleId>{69CF1AB2-1976-4502-BF36-3FF5EA218861}</a:tableStyleId>
+              </a:tblPr>
+              <a:tblGrid>
+                <a:gridCol w="3176336">
+                  <a:extLst>
+                    <a:ext uri="{9D8B030D-6E8A-4147-A177-3AD203B41FA5}">
+                      <a16:colId xmlns:a16="http://schemas.microsoft.com/office/drawing/2014/main" val="768004564"/>
+                    </a:ext>
+                  </a:extLst>
+                </a:gridCol>
+                <a:gridCol w="8133348">
+                  <a:extLst>
+                    <a:ext uri="{9D8B030D-6E8A-4147-A177-3AD203B41FA5}">
+                      <a16:colId xmlns:a16="http://schemas.microsoft.com/office/drawing/2014/main" val="2476489099"/>
+                    </a:ext>
+                  </a:extLst>
+                </a:gridCol>
+              </a:tblGrid>
+              <a:tr h="228474">
+                <a:tc>
+                  <a:txBody>
+                    <a:bodyPr/>
+                    <a:lstStyle/>
+                    <a:p>
+                      <a:pPr algn="ctr"/>
+                      <a:r>
+                        <a:rPr lang="ru-RU" sz="1800" dirty="0"/>
+                        <a:t>Виды деятельности:</a:t>
+                      </a:r>
+                      <a:endParaRPr lang="ru-RU" sz="1800" dirty="0">
+                        <a:latin typeface="Arial" panose="020B0604020202020204" pitchFamily="34" charset="0"/>
+                        <a:cs typeface="Arial" panose="020B0604020202020204" pitchFamily="34" charset="0"/>
+                      </a:endParaRPr>
+                    </a:p>
+                  </a:txBody>
+                  <a:tcPr marL="80175" marR="80175" marT="40087" marB="40087"/>
+                </a:tc>
+                <a:tc>
+                  <a:txBody>
+                    <a:bodyPr/>
+                    <a:lstStyle/>
+                    <a:p>
+                      <a:pPr marL="0" marR="0" lvl="0" indent="0" algn="ctr" defTabSz="914400" rtl="0" eaLnBrk="1" fontAlgn="auto" latinLnBrk="0" hangingPunct="1">
+                        <a:lnSpc>
+                          <a:spcPct val="100000"/>
+                        </a:lnSpc>
+                        <a:spcBef>
+                          <a:spcPts val="0"/>
+                        </a:spcBef>
+                        <a:spcAft>
+                          <a:spcPts val="0"/>
+                        </a:spcAft>
+                        <a:buClrTx/>
+                        <a:buSzTx/>
+                        <a:buFontTx/>
+                        <a:buNone/>
+                        <a:tabLst/>
+                        <a:defRPr/>
+                      </a:pPr>
+                      <a:r>
+                        <a:rPr lang="ru-RU" sz="1800" b="1" dirty="0">
+                          <a:solidFill>
+                            <a:schemeClr val="tx1">
+                              <a:lumMod val="85000"/>
+                              <a:lumOff val="15000"/>
+                            </a:schemeClr>
+                          </a:solidFill>
+                          <a:effectLst/>
+                        </a:rPr>
+                        <a:t>Функциональные задачи программного продукта:</a:t>
+                      </a:r>
+                      <a:endParaRPr lang="ru-RU" sz="1800" b="1" dirty="0">
+                        <a:solidFill>
+                          <a:schemeClr val="tx1">
+                            <a:lumMod val="85000"/>
+                            <a:lumOff val="15000"/>
+                          </a:schemeClr>
+                        </a:solidFill>
+                        <a:effectLst/>
+                        <a:highlight>
+                          <a:srgbClr val="FFFF00"/>
+                        </a:highlight>
+                      </a:endParaRPr>
+                    </a:p>
+                  </a:txBody>
+                  <a:tcPr marL="80175" marR="80175" marT="40087" marB="40087"/>
+                </a:tc>
+                <a:extLst>
+                  <a:ext uri="{0D108BD9-81ED-4DB2-BD59-A6C34878D82A}">
+                    <a16:rowId xmlns:a16="http://schemas.microsoft.com/office/drawing/2014/main" val="189619887"/>
+                  </a:ext>
+                </a:extLst>
+              </a:tr>
+              <a:tr h="2580680">
+                <a:tc>
+                  <a:txBody>
+                    <a:bodyPr/>
+                    <a:lstStyle/>
+                    <a:p>
+                      <a:r>
+                        <a:rPr lang="ru-RU" sz="1600" b="1" kern="1200" dirty="0">
+                          <a:solidFill>
+                            <a:schemeClr val="dk1"/>
+                          </a:solidFill>
+                          <a:effectLst/>
+                          <a:latin typeface="+mn-lt"/>
+                          <a:ea typeface="+mn-ea"/>
+                          <a:cs typeface="+mn-cs"/>
+                        </a:rPr>
+                        <a:t>Проектирование и разработка информационных систем</a:t>
+                      </a:r>
+                      <a:endParaRPr lang="ru-RU" sz="1600" kern="1200" dirty="0">
+                        <a:solidFill>
+                          <a:schemeClr val="dk1"/>
+                        </a:solidFill>
+                        <a:effectLst/>
+                        <a:latin typeface="+mn-lt"/>
+                        <a:ea typeface="+mn-ea"/>
+                        <a:cs typeface="+mn-cs"/>
+                      </a:endParaRPr>
+                    </a:p>
+                  </a:txBody>
+                  <a:tcPr marL="80175" marR="80175" marT="40087" marB="40087"/>
+                </a:tc>
+                <a:tc>
+                  <a:txBody>
+                    <a:bodyPr/>
+                    <a:lstStyle/>
+                    <a:p>
+                      <a:pPr marL="342900" marR="165100" lvl="0" indent="-342900" algn="just" defTabSz="914400" rtl="0" eaLnBrk="1" latinLnBrk="0" hangingPunct="1">
+                        <a:lnSpc>
+                          <a:spcPct val="100000"/>
+                        </a:lnSpc>
+                        <a:spcAft>
+                          <a:spcPts val="0"/>
+                        </a:spcAft>
+                        <a:buFont typeface="Symbol" panose="05050102010706020507" pitchFamily="18" charset="2"/>
+                        <a:buChar char=""/>
+                      </a:pPr>
+                      <a:r>
+                        <a:rPr lang="ru-RU" sz="1600" kern="1200" dirty="0">
+                          <a:solidFill>
+                            <a:schemeClr val="dk1"/>
+                          </a:solidFill>
+                          <a:latin typeface="+mn-lt"/>
+                          <a:ea typeface="+mn-ea"/>
+                          <a:cs typeface="+mn-cs"/>
+                        </a:rPr>
+                        <a:t>авторизация и регистрация пользователей;</a:t>
+                      </a:r>
+                    </a:p>
+                    <a:p>
+                      <a:pPr marL="342900" marR="165100" lvl="0" indent="-342900" algn="just" defTabSz="914400" rtl="0" eaLnBrk="1" latinLnBrk="0" hangingPunct="1">
+                        <a:lnSpc>
+                          <a:spcPct val="100000"/>
+                        </a:lnSpc>
+                        <a:spcAft>
+                          <a:spcPts val="0"/>
+                        </a:spcAft>
+                        <a:buFont typeface="Symbol" panose="05050102010706020507" pitchFamily="18" charset="2"/>
+                        <a:buChar char=""/>
+                      </a:pPr>
+                      <a:r>
+                        <a:rPr lang="ru-RU" sz="1600" kern="1200" dirty="0">
+                          <a:solidFill>
+                            <a:schemeClr val="dk1"/>
+                          </a:solidFill>
+                          <a:latin typeface="+mn-lt"/>
+                          <a:ea typeface="+mn-ea"/>
+                          <a:cs typeface="+mn-cs"/>
+                        </a:rPr>
+                        <a:t>возможность добавления товар в избранное;</a:t>
+                      </a:r>
+                    </a:p>
+                    <a:p>
+                      <a:pPr marL="342900" marR="165100" lvl="0" indent="-342900" algn="just" defTabSz="914400" rtl="0" eaLnBrk="1" latinLnBrk="0" hangingPunct="1">
+                        <a:lnSpc>
+                          <a:spcPct val="100000"/>
+                        </a:lnSpc>
+                        <a:spcAft>
+                          <a:spcPts val="0"/>
+                        </a:spcAft>
+                        <a:buFont typeface="Symbol" panose="05050102010706020507" pitchFamily="18" charset="2"/>
+                        <a:buChar char=""/>
+                      </a:pPr>
+                      <a:r>
+                        <a:rPr lang="ru-RU" sz="1600" kern="1200" dirty="0">
+                          <a:solidFill>
+                            <a:schemeClr val="dk1"/>
+                          </a:solidFill>
+                          <a:latin typeface="+mn-lt"/>
+                          <a:ea typeface="+mn-ea"/>
+                          <a:cs typeface="+mn-cs"/>
+                        </a:rPr>
+                        <a:t>возможность установки в личном кабинете даты рождения для получения бонусов;</a:t>
+                      </a:r>
+                    </a:p>
+                    <a:p>
+                      <a:pPr marL="342900" marR="165100" lvl="0" indent="-342900" algn="just" defTabSz="914400" rtl="0" eaLnBrk="1" latinLnBrk="0" hangingPunct="1">
+                        <a:lnSpc>
+                          <a:spcPct val="100000"/>
+                        </a:lnSpc>
+                        <a:spcAft>
+                          <a:spcPts val="0"/>
+                        </a:spcAft>
+                        <a:buFont typeface="Symbol" panose="05050102010706020507" pitchFamily="18" charset="2"/>
+                        <a:buChar char=""/>
+                      </a:pPr>
+                      <a:r>
+                        <a:rPr lang="ru-RU" sz="1600" kern="1200" dirty="0">
+                          <a:solidFill>
+                            <a:schemeClr val="dk1"/>
+                          </a:solidFill>
+                          <a:latin typeface="+mn-lt"/>
+                          <a:ea typeface="+mn-ea"/>
+                          <a:cs typeface="+mn-cs"/>
+                        </a:rPr>
+                        <a:t>возможность зарегистрированным пользователям предложить новый рецепт;</a:t>
+                      </a:r>
+                    </a:p>
+                    <a:p>
+                      <a:pPr marL="342900" marR="165100" lvl="0" indent="-342900" algn="just" defTabSz="914400" rtl="0" eaLnBrk="1" latinLnBrk="0" hangingPunct="1">
+                        <a:lnSpc>
+                          <a:spcPct val="100000"/>
+                        </a:lnSpc>
+                        <a:spcAft>
+                          <a:spcPts val="0"/>
+                        </a:spcAft>
+                        <a:buFont typeface="Symbol" panose="05050102010706020507" pitchFamily="18" charset="2"/>
+                        <a:buChar char=""/>
+                      </a:pPr>
+                      <a:r>
+                        <a:rPr lang="ru-RU" sz="1600" kern="1200" dirty="0">
+                          <a:solidFill>
+                            <a:schemeClr val="dk1"/>
+                          </a:solidFill>
+                          <a:latin typeface="+mn-lt"/>
+                          <a:ea typeface="+mn-ea"/>
+                          <a:cs typeface="+mn-cs"/>
+                        </a:rPr>
+                        <a:t>возможность редактирования и удаления аккаунта;</a:t>
+                      </a:r>
+                    </a:p>
+                    <a:p>
+                      <a:pPr marL="342900" marR="165100" lvl="0" indent="-342900" algn="just" defTabSz="914400" rtl="0" eaLnBrk="1" latinLnBrk="0" hangingPunct="1">
+                        <a:lnSpc>
+                          <a:spcPct val="100000"/>
+                        </a:lnSpc>
+                        <a:spcAft>
+                          <a:spcPts val="0"/>
+                        </a:spcAft>
+                        <a:buFont typeface="Symbol" panose="05050102010706020507" pitchFamily="18" charset="2"/>
+                        <a:buChar char=""/>
+                      </a:pPr>
+                      <a:r>
+                        <a:rPr lang="ru-RU" sz="1600" kern="1200" dirty="0">
+                          <a:solidFill>
+                            <a:schemeClr val="dk1"/>
+                          </a:solidFill>
+                          <a:latin typeface="+mn-lt"/>
+                          <a:ea typeface="+mn-ea"/>
+                          <a:cs typeface="+mn-cs"/>
+                        </a:rPr>
+                        <a:t>возможность просмотра истории заказов для пользователя;</a:t>
+                      </a:r>
+                    </a:p>
+                    <a:p>
+                      <a:pPr marL="342900" marR="165100" lvl="0" indent="-342900" algn="just" defTabSz="914400" rtl="0" eaLnBrk="1" latinLnBrk="0" hangingPunct="1">
+                        <a:lnSpc>
+                          <a:spcPct val="100000"/>
+                        </a:lnSpc>
+                        <a:spcAft>
+                          <a:spcPts val="0"/>
+                        </a:spcAft>
+                        <a:buFont typeface="Symbol" panose="05050102010706020507" pitchFamily="18" charset="2"/>
+                        <a:buChar char=""/>
+                      </a:pPr>
+                      <a:r>
+                        <a:rPr lang="ru-RU" sz="1600" kern="1200" dirty="0">
+                          <a:solidFill>
+                            <a:schemeClr val="dk1"/>
+                          </a:solidFill>
+                          <a:latin typeface="+mn-lt"/>
+                          <a:ea typeface="+mn-ea"/>
+                          <a:cs typeface="+mn-cs"/>
+                        </a:rPr>
+                        <a:t>возможность формирования заказа пользователя, вариантов доставки;</a:t>
+                      </a:r>
+                    </a:p>
+                    <a:p>
+                      <a:pPr marL="342900" marR="165100" lvl="0" indent="-342900" algn="just" defTabSz="914400" rtl="0" eaLnBrk="1" latinLnBrk="0" hangingPunct="1">
+                        <a:lnSpc>
+                          <a:spcPct val="100000"/>
+                        </a:lnSpc>
+                        <a:spcAft>
+                          <a:spcPts val="0"/>
+                        </a:spcAft>
+                        <a:buFont typeface="Symbol" panose="05050102010706020507" pitchFamily="18" charset="2"/>
+                        <a:buChar char=""/>
+                      </a:pPr>
+                      <a:r>
+                        <a:rPr lang="ru-RU" sz="1600" kern="1200" dirty="0">
+                          <a:solidFill>
+                            <a:schemeClr val="dk1"/>
+                          </a:solidFill>
+                          <a:latin typeface="+mn-lt"/>
+                          <a:ea typeface="+mn-ea"/>
+                          <a:cs typeface="+mn-cs"/>
+                        </a:rPr>
+                        <a:t>возможность поиска заказов для доставки на карте;</a:t>
+                      </a:r>
+                    </a:p>
+                    <a:p>
+                      <a:pPr marL="342900" marR="165100" lvl="0" indent="-342900" algn="just" defTabSz="914400" rtl="0" eaLnBrk="1" latinLnBrk="0" hangingPunct="1">
+                        <a:lnSpc>
+                          <a:spcPct val="100000"/>
+                        </a:lnSpc>
+                        <a:spcAft>
+                          <a:spcPts val="0"/>
+                        </a:spcAft>
+                        <a:buFont typeface="Symbol" panose="05050102010706020507" pitchFamily="18" charset="2"/>
+                        <a:buChar char=""/>
+                      </a:pPr>
+                      <a:r>
+                        <a:rPr lang="ru-RU" sz="1600" kern="1200" dirty="0">
+                          <a:solidFill>
+                            <a:schemeClr val="dk1"/>
+                          </a:solidFill>
+                          <a:latin typeface="+mn-lt"/>
+                          <a:ea typeface="+mn-ea"/>
+                          <a:cs typeface="+mn-cs"/>
+                        </a:rPr>
+                        <a:t>возможность просмотра выполненных заказов для курьеров;</a:t>
+                      </a:r>
+                    </a:p>
+                    <a:p>
+                      <a:pPr marL="342900" marR="165100" lvl="0" indent="-342900" algn="just" defTabSz="914400" rtl="0" eaLnBrk="1" latinLnBrk="0" hangingPunct="1">
+                        <a:lnSpc>
+                          <a:spcPct val="100000"/>
+                        </a:lnSpc>
+                        <a:spcAft>
+                          <a:spcPts val="0"/>
+                        </a:spcAft>
+                        <a:buFont typeface="Symbol" panose="05050102010706020507" pitchFamily="18" charset="2"/>
+                        <a:buChar char=""/>
+                      </a:pPr>
+                      <a:r>
+                        <a:rPr lang="ru-RU" sz="1600" kern="1200" dirty="0">
+                          <a:solidFill>
+                            <a:schemeClr val="dk1"/>
+                          </a:solidFill>
+                          <a:latin typeface="+mn-lt"/>
+                          <a:ea typeface="+mn-ea"/>
+                          <a:cs typeface="+mn-cs"/>
+                        </a:rPr>
+                        <a:t>управление товарами, аккаунтами, заказами, рецептами;</a:t>
+                      </a:r>
+                    </a:p>
+                    <a:p>
+                      <a:pPr marL="342900" marR="165100" lvl="0" indent="-342900" algn="just" defTabSz="914400" rtl="0" eaLnBrk="1" latinLnBrk="0" hangingPunct="1">
+                        <a:lnSpc>
+                          <a:spcPct val="100000"/>
+                        </a:lnSpc>
+                        <a:spcAft>
+                          <a:spcPts val="0"/>
+                        </a:spcAft>
+                        <a:buFont typeface="Symbol" panose="05050102010706020507" pitchFamily="18" charset="2"/>
+                        <a:buChar char=""/>
+                      </a:pPr>
+                      <a:r>
+                        <a:rPr lang="ru-RU" sz="1600" kern="1200" dirty="0">
+                          <a:solidFill>
+                            <a:schemeClr val="dk1"/>
+                          </a:solidFill>
+                          <a:latin typeface="+mn-lt"/>
+                          <a:ea typeface="+mn-ea"/>
+                          <a:cs typeface="+mn-cs"/>
+                        </a:rPr>
+                        <a:t>возможность просмотра статистики заказов;</a:t>
+                      </a:r>
+                    </a:p>
+                    <a:p>
+                      <a:pPr marL="342900" marR="165100" lvl="0" indent="-342900" algn="just" defTabSz="914400" rtl="0" eaLnBrk="1" latinLnBrk="0" hangingPunct="1">
+                        <a:lnSpc>
+                          <a:spcPct val="100000"/>
+                        </a:lnSpc>
+                        <a:spcAft>
+                          <a:spcPts val="0"/>
+                        </a:spcAft>
+                        <a:buFont typeface="Symbol" panose="05050102010706020507" pitchFamily="18" charset="2"/>
+                        <a:buChar char=""/>
+                      </a:pPr>
+                      <a:r>
+                        <a:rPr lang="ru-RU" sz="1600" kern="1200" dirty="0">
+                          <a:solidFill>
+                            <a:schemeClr val="dk1"/>
+                          </a:solidFill>
+                          <a:latin typeface="+mn-lt"/>
+                          <a:ea typeface="+mn-ea"/>
+                          <a:cs typeface="+mn-cs"/>
+                        </a:rPr>
+                        <a:t>наличие обратной связи между персоналом и администратором.</a:t>
+                      </a:r>
+                    </a:p>
+                  </a:txBody>
+                  <a:tcPr marL="80175" marR="80175" marT="40087" marB="40087"/>
+                </a:tc>
+                <a:extLst>
+                  <a:ext uri="{0D108BD9-81ED-4DB2-BD59-A6C34878D82A}">
+                    <a16:rowId xmlns:a16="http://schemas.microsoft.com/office/drawing/2014/main" val="3534808504"/>
+                  </a:ext>
+                </a:extLst>
+              </a:tr>
+              <a:tr h="643965">
+                <a:tc>
+                  <a:txBody>
+                    <a:bodyPr/>
+                    <a:lstStyle/>
+                    <a:p>
+                      <a:pPr marL="0" algn="l" defTabSz="914400" rtl="0" eaLnBrk="1" latinLnBrk="0" hangingPunct="1"/>
+                      <a:r>
+                        <a:rPr lang="ru-RU" sz="1600" b="1" kern="1200" dirty="0">
+                          <a:solidFill>
+                            <a:schemeClr val="dk1"/>
+                          </a:solidFill>
+                          <a:effectLst/>
+                          <a:latin typeface="+mn-lt"/>
+                          <a:ea typeface="+mn-ea"/>
+                          <a:cs typeface="+mn-cs"/>
+                        </a:rPr>
+                        <a:t>Разработка дизайна веб-приложений</a:t>
+                      </a:r>
+                      <a:endParaRPr lang="ru-RU" sz="1600" dirty="0"/>
+                    </a:p>
+                  </a:txBody>
+                  <a:tcPr marL="80175" marR="80175" marT="40087" marB="40087"/>
+                </a:tc>
+                <a:tc>
+                  <a:txBody>
+                    <a:bodyPr/>
+                    <a:lstStyle/>
+                    <a:p>
+                      <a:pPr lvl="0"/>
+                      <a:r>
+                        <a:rPr lang="ru-RU" sz="1600" kern="1200" dirty="0">
+                          <a:solidFill>
+                            <a:schemeClr val="dk1"/>
+                          </a:solidFill>
+                          <a:effectLst/>
+                          <a:latin typeface="+mn-lt"/>
+                          <a:ea typeface="+mn-ea"/>
+                          <a:cs typeface="+mn-cs"/>
+                        </a:rPr>
+                        <a:t>Проектирование пользовательского интерфейса программного продукта.</a:t>
+                      </a:r>
+                    </a:p>
+                  </a:txBody>
+                  <a:tcPr marL="80175" marR="80175" marT="40087" marB="40087"/>
+                </a:tc>
+                <a:extLst>
+                  <a:ext uri="{0D108BD9-81ED-4DB2-BD59-A6C34878D82A}">
+                    <a16:rowId xmlns:a16="http://schemas.microsoft.com/office/drawing/2014/main" val="3560326122"/>
+                  </a:ext>
+                </a:extLst>
+              </a:tr>
+              <a:tr h="905642">
+                <a:tc>
+                  <a:txBody>
+                    <a:bodyPr/>
+                    <a:lstStyle/>
+                    <a:p>
+                      <a:pPr marL="0" algn="l" defTabSz="914400" rtl="0" eaLnBrk="1" latinLnBrk="0" hangingPunct="1"/>
+                      <a:r>
+                        <a:rPr lang="ru-RU" sz="1600" b="1" kern="1200" dirty="0">
+                          <a:solidFill>
+                            <a:schemeClr val="dk1"/>
+                          </a:solidFill>
+                          <a:effectLst/>
+                          <a:latin typeface="+mn-lt"/>
+                          <a:ea typeface="+mn-ea"/>
+                          <a:cs typeface="+mn-cs"/>
+                        </a:rPr>
+                        <a:t>Проектирование, разработка и оптимизация веб-приложений</a:t>
+                      </a:r>
+                      <a:endParaRPr lang="ru-RU" sz="1600" dirty="0"/>
+                    </a:p>
+                  </a:txBody>
+                  <a:tcPr marL="80175" marR="80175" marT="40087" marB="40087"/>
+                </a:tc>
+                <a:tc>
+                  <a:txBody>
+                    <a:bodyPr/>
+                    <a:lstStyle/>
+                    <a:p>
+                      <a:pPr marL="342900" marR="165100" lvl="0" indent="-342900" algn="just" defTabSz="914400" rtl="0" eaLnBrk="1" latinLnBrk="0" hangingPunct="1">
+                        <a:lnSpc>
+                          <a:spcPct val="100000"/>
+                        </a:lnSpc>
+                        <a:spcAft>
+                          <a:spcPts val="0"/>
+                        </a:spcAft>
+                        <a:buFont typeface="Symbol" panose="05050102010706020507" pitchFamily="18" charset="2"/>
+                        <a:buChar char=""/>
+                      </a:pPr>
+                      <a:r>
+                        <a:rPr lang="ru-RU" sz="1600" kern="1200" dirty="0">
+                          <a:solidFill>
+                            <a:schemeClr val="dk1"/>
+                          </a:solidFill>
+                          <a:latin typeface="+mn-lt"/>
+                          <a:ea typeface="+mn-ea"/>
+                          <a:cs typeface="+mn-cs"/>
+                        </a:rPr>
+                        <a:t>Исследование предметной области;</a:t>
+                      </a:r>
+                    </a:p>
+                    <a:p>
+                      <a:pPr marL="342900" marR="165100" lvl="0" indent="-342900" algn="just">
+                        <a:lnSpc>
+                          <a:spcPct val="100000"/>
+                        </a:lnSpc>
+                        <a:spcAft>
+                          <a:spcPts val="0"/>
+                        </a:spcAft>
+                        <a:buFont typeface="Symbol" panose="05050102010706020507" pitchFamily="18" charset="2"/>
+                        <a:buChar char=""/>
+                      </a:pPr>
+                      <a:r>
+                        <a:rPr lang="ru-RU" sz="1600" dirty="0"/>
+                        <a:t>Проектирование диаграмм;</a:t>
+                      </a:r>
+                      <a:endParaRPr lang="en-US" sz="1600" dirty="0"/>
+                    </a:p>
+                    <a:p>
+                      <a:pPr marL="342900" marR="165100" lvl="0" indent="-342900" algn="just" defTabSz="914400" rtl="0" eaLnBrk="1" latinLnBrk="0" hangingPunct="1">
+                        <a:lnSpc>
+                          <a:spcPct val="100000"/>
+                        </a:lnSpc>
+                        <a:spcAft>
+                          <a:spcPts val="0"/>
+                        </a:spcAft>
+                        <a:buFont typeface="Symbol" panose="05050102010706020507" pitchFamily="18" charset="2"/>
+                        <a:buChar char=""/>
+                      </a:pPr>
+                      <a:r>
+                        <a:rPr lang="ru-RU" sz="1600" kern="1200" dirty="0">
+                          <a:solidFill>
+                            <a:schemeClr val="dk1"/>
+                          </a:solidFill>
+                          <a:latin typeface="+mn-lt"/>
+                          <a:ea typeface="+mn-ea"/>
+                          <a:cs typeface="+mn-cs"/>
+                        </a:rPr>
+                        <a:t>Проектирование интерфейса</a:t>
+                      </a:r>
+                      <a:r>
+                        <a:rPr lang="en-US" sz="1600" kern="1200" dirty="0">
+                          <a:solidFill>
+                            <a:schemeClr val="dk1"/>
+                          </a:solidFill>
+                          <a:latin typeface="+mn-lt"/>
+                          <a:ea typeface="+mn-ea"/>
+                          <a:cs typeface="+mn-cs"/>
+                        </a:rPr>
+                        <a:t>;</a:t>
+                      </a:r>
+                      <a:endParaRPr lang="ru-RU" sz="1600" kern="1200" dirty="0">
+                        <a:solidFill>
+                          <a:schemeClr val="dk1"/>
+                        </a:solidFill>
+                        <a:latin typeface="+mn-lt"/>
+                        <a:ea typeface="+mn-ea"/>
+                        <a:cs typeface="+mn-cs"/>
+                      </a:endParaRPr>
+                    </a:p>
+                    <a:p>
+                      <a:pPr marL="342900" marR="165100" lvl="0" indent="-342900" algn="just">
+                        <a:lnSpc>
+                          <a:spcPct val="100000"/>
+                        </a:lnSpc>
+                        <a:spcAft>
+                          <a:spcPts val="0"/>
+                        </a:spcAft>
+                        <a:buFont typeface="Symbol" panose="05050102010706020507" pitchFamily="18" charset="2"/>
+                        <a:buChar char=""/>
+                      </a:pPr>
+                      <a:r>
+                        <a:rPr lang="ru-RU" sz="1600" dirty="0"/>
+                        <a:t>Проектирование базы данных.</a:t>
+                      </a:r>
+                    </a:p>
+                    <a:p>
+                      <a:pPr marL="342900" marR="165100" lvl="0" indent="-342900" algn="just" defTabSz="914400" rtl="0" eaLnBrk="1" latinLnBrk="0" hangingPunct="1">
+                        <a:lnSpc>
+                          <a:spcPct val="100000"/>
+                        </a:lnSpc>
+                        <a:spcAft>
+                          <a:spcPts val="0"/>
+                        </a:spcAft>
+                        <a:buFont typeface="Symbol" panose="05050102010706020507" pitchFamily="18" charset="2"/>
+                        <a:buChar char=""/>
+                      </a:pPr>
+                      <a:r>
+                        <a:rPr lang="ru-RU" sz="1600" kern="1200" dirty="0">
+                          <a:solidFill>
+                            <a:schemeClr val="dk1"/>
+                          </a:solidFill>
+                          <a:latin typeface="+mn-lt"/>
+                          <a:ea typeface="+mn-ea"/>
+                          <a:cs typeface="+mn-cs"/>
+                        </a:rPr>
+                        <a:t>Разработка руководства пользователя программного продукта. </a:t>
+                      </a:r>
+                    </a:p>
+                  </a:txBody>
+                  <a:tcPr marL="80175" marR="80175" marT="40087" marB="40087"/>
+                </a:tc>
+                <a:extLst>
+                  <a:ext uri="{0D108BD9-81ED-4DB2-BD59-A6C34878D82A}">
+                    <a16:rowId xmlns:a16="http://schemas.microsoft.com/office/drawing/2014/main" val="615231817"/>
+                  </a:ext>
+                </a:extLst>
+              </a:tr>
+            </a:tbl>
+          </a:graphicData>
+        </a:graphic>
+      </p:graphicFrame>
+      <p:sp>
+        <p:nvSpPr>
+          <p:cNvPr id="2" name="Номер слайда 1">
+            <a:extLst>
+              <a:ext uri="{FF2B5EF4-FFF2-40B4-BE49-F238E27FC236}">
+                <a16:creationId xmlns:a16="http://schemas.microsoft.com/office/drawing/2014/main" id="{B32D5911-8BC7-FCC4-C243-4D2D185925E0}"/>
+              </a:ext>
+            </a:extLst>
+          </p:cNvPr>
+          <p:cNvSpPr>
+            <a:spLocks noGrp="1"/>
+          </p:cNvSpPr>
+          <p:nvPr>
+            <p:ph type="sldNum" sz="quarter" idx="12"/>
+          </p:nvPr>
+        </p:nvSpPr>
+        <p:spPr>
+          <a:xfrm>
+            <a:off x="9900458" y="6459785"/>
+            <a:ext cx="1312025" cy="365125"/>
+          </a:xfrm>
+        </p:spPr>
+        <p:txBody>
+          <a:bodyPr/>
+          <a:lstStyle/>
+          <a:p>
+            <a:fld id="{6117FFAF-1985-4180-A0D2-72FEAD882164}" type="slidenum">
+              <a:rPr lang="ru-RU" sz="1800" smtClean="0"/>
+              <a:t>7</a:t>
+            </a:fld>
+            <a:endParaRPr lang="ru-RU" sz="1800"/>
+          </a:p>
+        </p:txBody>
+      </p:sp>
     </p:spTree>
     <p:extLst>
       <p:ext uri="{BB962C8B-B14F-4D97-AF65-F5344CB8AC3E}">
-        <p14:creationId xmlns:p14="http://schemas.microsoft.com/office/powerpoint/2010/main" val="2738709802"/>
+        <p14:creationId xmlns:p14="http://schemas.microsoft.com/office/powerpoint/2010/main" val="3364795829"/>
       </p:ext>
     </p:extLst>
   </p:cSld>

</xml_diff>